<commit_message>
revision slide deck + Hierarchization of events
</commit_message>
<xml_diff>
--- a/SCO/working materials/Slide deck - SCO-UFO aligment.pptx
+++ b/SCO/working materials/Slide deck - SCO-UFO aligment.pptx
@@ -5,7 +5,7 @@
     <p:sldMasterId id="2147483648" r:id="rId1"/>
   </p:sldMasterIdLst>
   <p:notesMasterIdLst>
-    <p:notesMasterId r:id="rId10"/>
+    <p:notesMasterId r:id="rId11"/>
   </p:notesMasterIdLst>
   <p:sldIdLst>
     <p:sldId id="256" r:id="rId2"/>
@@ -15,7 +15,8 @@
     <p:sldId id="260" r:id="rId6"/>
     <p:sldId id="257" r:id="rId7"/>
     <p:sldId id="263" r:id="rId8"/>
-    <p:sldId id="259" r:id="rId9"/>
+    <p:sldId id="264" r:id="rId9"/>
+    <p:sldId id="259" r:id="rId10"/>
   </p:sldIdLst>
   <p:sldSz cx="12192000" cy="6858000"/>
   <p:notesSz cx="6858000" cy="9144000"/>
@@ -204,7 +205,7 @@
           <a:p>
             <a:fld id="{03C72250-7A58-4674-B3F7-A9077735BB67}" type="datetimeFigureOut">
               <a:rPr lang="it-IT" smtClean="0"/>
-              <a:t>29/01/2025</a:t>
+              <a:t>31/01/2025</a:t>
             </a:fld>
             <a:endParaRPr lang="it-IT"/>
           </a:p>
@@ -621,7 +622,7 @@
           <a:p>
             <a:fld id="{C8F8D270-4168-40DB-AC4E-630264CAC1B5}" type="datetimeFigureOut">
               <a:rPr lang="it-IT" smtClean="0"/>
-              <a:t>29/01/2025</a:t>
+              <a:t>31/01/2025</a:t>
             </a:fld>
             <a:endParaRPr lang="it-IT"/>
           </a:p>
@@ -821,7 +822,7 @@
           <a:p>
             <a:fld id="{C8F8D270-4168-40DB-AC4E-630264CAC1B5}" type="datetimeFigureOut">
               <a:rPr lang="it-IT" smtClean="0"/>
-              <a:t>29/01/2025</a:t>
+              <a:t>31/01/2025</a:t>
             </a:fld>
             <a:endParaRPr lang="it-IT"/>
           </a:p>
@@ -1031,7 +1032,7 @@
           <a:p>
             <a:fld id="{C8F8D270-4168-40DB-AC4E-630264CAC1B5}" type="datetimeFigureOut">
               <a:rPr lang="it-IT" smtClean="0"/>
-              <a:t>29/01/2025</a:t>
+              <a:t>31/01/2025</a:t>
             </a:fld>
             <a:endParaRPr lang="it-IT"/>
           </a:p>
@@ -1231,7 +1232,7 @@
           <a:p>
             <a:fld id="{C8F8D270-4168-40DB-AC4E-630264CAC1B5}" type="datetimeFigureOut">
               <a:rPr lang="it-IT" smtClean="0"/>
-              <a:t>29/01/2025</a:t>
+              <a:t>31/01/2025</a:t>
             </a:fld>
             <a:endParaRPr lang="it-IT"/>
           </a:p>
@@ -1507,7 +1508,7 @@
           <a:p>
             <a:fld id="{C8F8D270-4168-40DB-AC4E-630264CAC1B5}" type="datetimeFigureOut">
               <a:rPr lang="it-IT" smtClean="0"/>
-              <a:t>29/01/2025</a:t>
+              <a:t>31/01/2025</a:t>
             </a:fld>
             <a:endParaRPr lang="it-IT"/>
           </a:p>
@@ -1775,7 +1776,7 @@
           <a:p>
             <a:fld id="{C8F8D270-4168-40DB-AC4E-630264CAC1B5}" type="datetimeFigureOut">
               <a:rPr lang="it-IT" smtClean="0"/>
-              <a:t>29/01/2025</a:t>
+              <a:t>31/01/2025</a:t>
             </a:fld>
             <a:endParaRPr lang="it-IT"/>
           </a:p>
@@ -2190,7 +2191,7 @@
           <a:p>
             <a:fld id="{C8F8D270-4168-40DB-AC4E-630264CAC1B5}" type="datetimeFigureOut">
               <a:rPr lang="it-IT" smtClean="0"/>
-              <a:t>29/01/2025</a:t>
+              <a:t>31/01/2025</a:t>
             </a:fld>
             <a:endParaRPr lang="it-IT"/>
           </a:p>
@@ -2332,7 +2333,7 @@
           <a:p>
             <a:fld id="{C8F8D270-4168-40DB-AC4E-630264CAC1B5}" type="datetimeFigureOut">
               <a:rPr lang="it-IT" smtClean="0"/>
-              <a:t>29/01/2025</a:t>
+              <a:t>31/01/2025</a:t>
             </a:fld>
             <a:endParaRPr lang="it-IT"/>
           </a:p>
@@ -2445,7 +2446,7 @@
           <a:p>
             <a:fld id="{C8F8D270-4168-40DB-AC4E-630264CAC1B5}" type="datetimeFigureOut">
               <a:rPr lang="it-IT" smtClean="0"/>
-              <a:t>29/01/2025</a:t>
+              <a:t>31/01/2025</a:t>
             </a:fld>
             <a:endParaRPr lang="it-IT"/>
           </a:p>
@@ -2758,7 +2759,7 @@
           <a:p>
             <a:fld id="{C8F8D270-4168-40DB-AC4E-630264CAC1B5}" type="datetimeFigureOut">
               <a:rPr lang="it-IT" smtClean="0"/>
-              <a:t>29/01/2025</a:t>
+              <a:t>31/01/2025</a:t>
             </a:fld>
             <a:endParaRPr lang="it-IT"/>
           </a:p>
@@ -3047,7 +3048,7 @@
           <a:p>
             <a:fld id="{C8F8D270-4168-40DB-AC4E-630264CAC1B5}" type="datetimeFigureOut">
               <a:rPr lang="it-IT" smtClean="0"/>
-              <a:t>29/01/2025</a:t>
+              <a:t>31/01/2025</a:t>
             </a:fld>
             <a:endParaRPr lang="it-IT"/>
           </a:p>
@@ -3290,7 +3291,7 @@
           <a:p>
             <a:fld id="{C8F8D270-4168-40DB-AC4E-630264CAC1B5}" type="datetimeFigureOut">
               <a:rPr lang="it-IT" smtClean="0"/>
-              <a:t>29/01/2025</a:t>
+              <a:t>31/01/2025</a:t>
             </a:fld>
             <a:endParaRPr lang="it-IT"/>
           </a:p>
@@ -4824,7 +4825,7 @@
                 <a:latin typeface="Arial" panose="020B0604020202020204" pitchFamily="34" charset="0"/>
                 <a:cs typeface="Arial" panose="020B0604020202020204" pitchFamily="34" charset="0"/>
               </a:rPr>
-              <a:t>Complex System, Components, and Interactions.</a:t>
+              <a:t>Example: Complex System, Components, and Interactions.</a:t>
             </a:r>
             <a:endParaRPr lang="it-IT" sz="3600" dirty="0">
               <a:latin typeface="Arial" panose="020B0604020202020204" pitchFamily="34" charset="0"/>
@@ -4925,6 +4926,86 @@
   <p:cSld>
     <p:spTree>
       <p:nvGrpSpPr>
+        <p:cNvPr id="1" name=""/>
+        <p:cNvGrpSpPr/>
+        <p:nvPr/>
+      </p:nvGrpSpPr>
+      <p:grpSpPr>
+        <a:xfrm>
+          <a:off x="0" y="0"/>
+          <a:ext cx="0" cy="0"/>
+          <a:chOff x="0" y="0"/>
+          <a:chExt cx="0" cy="0"/>
+        </a:xfrm>
+      </p:grpSpPr>
+      <p:sp>
+        <p:nvSpPr>
+          <p:cNvPr id="2" name="Title 1">
+            <a:extLst>
+              <a:ext uri="{FF2B5EF4-FFF2-40B4-BE49-F238E27FC236}">
+                <a16:creationId xmlns:a16="http://schemas.microsoft.com/office/drawing/2014/main" id="{74599347-6F32-A7D6-9DC9-C494086F5C21}"/>
+              </a:ext>
+            </a:extLst>
+          </p:cNvPr>
+          <p:cNvSpPr>
+            <a:spLocks noGrp="1"/>
+          </p:cNvSpPr>
+          <p:nvPr>
+            <p:ph type="title"/>
+          </p:nvPr>
+        </p:nvSpPr>
+        <p:spPr/>
+        <p:txBody>
+          <a:bodyPr/>
+          <a:lstStyle/>
+          <a:p>
+            <a:endParaRPr lang="it-IT"/>
+          </a:p>
+        </p:txBody>
+      </p:sp>
+      <p:sp>
+        <p:nvSpPr>
+          <p:cNvPr id="3" name="Content Placeholder 2">
+            <a:extLst>
+              <a:ext uri="{FF2B5EF4-FFF2-40B4-BE49-F238E27FC236}">
+                <a16:creationId xmlns:a16="http://schemas.microsoft.com/office/drawing/2014/main" id="{43E1F1DD-6835-E9CE-438E-5D8BBB15143F}"/>
+              </a:ext>
+            </a:extLst>
+          </p:cNvPr>
+          <p:cNvSpPr>
+            <a:spLocks noGrp="1"/>
+          </p:cNvSpPr>
+          <p:nvPr>
+            <p:ph idx="1"/>
+          </p:nvPr>
+        </p:nvSpPr>
+        <p:spPr/>
+        <p:txBody>
+          <a:bodyPr/>
+          <a:lstStyle/>
+          <a:p>
+            <a:endParaRPr lang="it-IT" dirty="0"/>
+          </a:p>
+        </p:txBody>
+      </p:sp>
+    </p:spTree>
+    <p:extLst>
+      <p:ext uri="{BB962C8B-B14F-4D97-AF65-F5344CB8AC3E}">
+        <p14:creationId xmlns:p14="http://schemas.microsoft.com/office/powerpoint/2010/main" val="936711700"/>
+      </p:ext>
+    </p:extLst>
+  </p:cSld>
+  <p:clrMapOvr>
+    <a:masterClrMapping/>
+  </p:clrMapOvr>
+</p:sld>
+</file>
+
+<file path=ppt/slides/slide9.xml><?xml version="1.0" encoding="utf-8"?>
+<p:sld xmlns:a="http://schemas.openxmlformats.org/drawingml/2006/main" xmlns:r="http://schemas.openxmlformats.org/officeDocument/2006/relationships" xmlns:p="http://schemas.openxmlformats.org/presentationml/2006/main">
+  <p:cSld>
+    <p:spTree>
+      <p:nvGrpSpPr>
         <p:cNvPr id="1" name="">
           <a:extLst>
             <a:ext uri="{FF2B5EF4-FFF2-40B4-BE49-F238E27FC236}">
@@ -4966,10 +5047,275 @@
           </a:bodyPr>
           <a:lstStyle/>
           <a:p>
-            <a:endParaRPr lang="it-IT" sz="3600" dirty="0">
+            <a:r>
+              <a:rPr lang="en-US" dirty="0">
+                <a:latin typeface="Arial" panose="020B0604020202020204" pitchFamily="34" charset="0"/>
+                <a:cs typeface="Arial" panose="020B0604020202020204" pitchFamily="34" charset="0"/>
+              </a:rPr>
+              <a:t>References </a:t>
+            </a:r>
+            <a:endParaRPr lang="it-IT" dirty="0">
               <a:latin typeface="Arial" panose="020B0604020202020204" pitchFamily="34" charset="0"/>
               <a:cs typeface="Arial" panose="020B0604020202020204" pitchFamily="34" charset="0"/>
             </a:endParaRPr>
+          </a:p>
+        </p:txBody>
+      </p:sp>
+      <p:sp>
+        <p:nvSpPr>
+          <p:cNvPr id="9" name="Content Placeholder 2">
+            <a:extLst>
+              <a:ext uri="{FF2B5EF4-FFF2-40B4-BE49-F238E27FC236}">
+                <a16:creationId xmlns:a16="http://schemas.microsoft.com/office/drawing/2014/main" id="{FD700632-7E70-F24B-4874-0356A04AA681}"/>
+              </a:ext>
+            </a:extLst>
+          </p:cNvPr>
+          <p:cNvSpPr>
+            <a:spLocks noGrp="1"/>
+          </p:cNvSpPr>
+          <p:nvPr>
+            <p:ph idx="1"/>
+          </p:nvPr>
+        </p:nvSpPr>
+        <p:spPr>
+          <a:xfrm>
+            <a:off x="838200" y="1825625"/>
+            <a:ext cx="10515600" cy="4351338"/>
+          </a:xfrm>
+        </p:spPr>
+        <p:txBody>
+          <a:bodyPr>
+            <a:normAutofit/>
+          </a:bodyPr>
+          <a:lstStyle/>
+          <a:p>
+            <a:pPr>
+              <a:lnSpc>
+                <a:spcPct val="107000"/>
+              </a:lnSpc>
+              <a:spcAft>
+                <a:spcPts val="800"/>
+              </a:spcAft>
+            </a:pPr>
+            <a:r>
+              <a:rPr lang="en-US" sz="2000" kern="100" dirty="0">
+                <a:effectLst/>
+                <a:latin typeface="Calibri" panose="020F0502020204030204" pitchFamily="34" charset="0"/>
+                <a:ea typeface="Calibri" panose="020F0502020204030204" pitchFamily="34" charset="0"/>
+                <a:cs typeface="Calibri" panose="020F0502020204030204" pitchFamily="34" charset="0"/>
+              </a:rPr>
+              <a:t>Arp, R., Smith, B., &amp; Spear, A. D. (2015). </a:t>
+            </a:r>
+            <a:r>
+              <a:rPr lang="en-US" sz="2000" i="1" kern="100" dirty="0">
+                <a:effectLst/>
+                <a:latin typeface="Calibri" panose="020F0502020204030204" pitchFamily="34" charset="0"/>
+                <a:ea typeface="Calibri" panose="020F0502020204030204" pitchFamily="34" charset="0"/>
+                <a:cs typeface="Calibri" panose="020F0502020204030204" pitchFamily="34" charset="0"/>
+              </a:rPr>
+              <a:t>Building ontologies with Basic Formal Ontology</a:t>
+            </a:r>
+            <a:r>
+              <a:rPr lang="en-US" sz="2000" kern="100" dirty="0">
+                <a:effectLst/>
+                <a:latin typeface="Calibri" panose="020F0502020204030204" pitchFamily="34" charset="0"/>
+                <a:ea typeface="Calibri" panose="020F0502020204030204" pitchFamily="34" charset="0"/>
+                <a:cs typeface="Calibri" panose="020F0502020204030204" pitchFamily="34" charset="0"/>
+              </a:rPr>
+              <a:t>. Massachusetts Institute of Technology.</a:t>
+            </a:r>
+            <a:endParaRPr lang="it-IT" sz="2000" kern="100" dirty="0">
+              <a:effectLst/>
+              <a:latin typeface="Calibri" panose="020F0502020204030204" pitchFamily="34" charset="0"/>
+              <a:ea typeface="Calibri" panose="020F0502020204030204" pitchFamily="34" charset="0"/>
+              <a:cs typeface="Calibri" panose="020F0502020204030204" pitchFamily="34" charset="0"/>
+            </a:endParaRPr>
+          </a:p>
+          <a:p>
+            <a:pPr>
+              <a:lnSpc>
+                <a:spcPct val="107000"/>
+              </a:lnSpc>
+              <a:spcAft>
+                <a:spcPts val="800"/>
+              </a:spcAft>
+            </a:pPr>
+            <a:r>
+              <a:rPr lang="it-IT" sz="2000" kern="100" dirty="0">
+                <a:effectLst/>
+                <a:latin typeface="Calibri" panose="020F0502020204030204" pitchFamily="34" charset="0"/>
+                <a:ea typeface="Calibri" panose="020F0502020204030204" pitchFamily="34" charset="0"/>
+                <a:cs typeface="Calibri" panose="020F0502020204030204" pitchFamily="34" charset="0"/>
+              </a:rPr>
+              <a:t>Guizzardi, G., Botti </a:t>
+            </a:r>
+            <a:r>
+              <a:rPr lang="it-IT" sz="2000" kern="100" dirty="0" err="1">
+                <a:effectLst/>
+                <a:latin typeface="Calibri" panose="020F0502020204030204" pitchFamily="34" charset="0"/>
+                <a:ea typeface="Calibri" panose="020F0502020204030204" pitchFamily="34" charset="0"/>
+                <a:cs typeface="Calibri" panose="020F0502020204030204" pitchFamily="34" charset="0"/>
+              </a:rPr>
+              <a:t>Benevides</a:t>
+            </a:r>
+            <a:r>
+              <a:rPr lang="it-IT" sz="2000" kern="100" dirty="0">
+                <a:effectLst/>
+                <a:latin typeface="Calibri" panose="020F0502020204030204" pitchFamily="34" charset="0"/>
+                <a:ea typeface="Calibri" panose="020F0502020204030204" pitchFamily="34" charset="0"/>
+                <a:cs typeface="Calibri" panose="020F0502020204030204" pitchFamily="34" charset="0"/>
+              </a:rPr>
+              <a:t>, A., Fonseca, C. M., </a:t>
+            </a:r>
+            <a:r>
+              <a:rPr lang="it-IT" sz="2000" kern="100" dirty="0" err="1">
+                <a:effectLst/>
+                <a:latin typeface="Calibri" panose="020F0502020204030204" pitchFamily="34" charset="0"/>
+                <a:ea typeface="Calibri" panose="020F0502020204030204" pitchFamily="34" charset="0"/>
+                <a:cs typeface="Calibri" panose="020F0502020204030204" pitchFamily="34" charset="0"/>
+              </a:rPr>
+              <a:t>Porello</a:t>
+            </a:r>
+            <a:r>
+              <a:rPr lang="it-IT" sz="2000" kern="100" dirty="0">
+                <a:effectLst/>
+                <a:latin typeface="Calibri" panose="020F0502020204030204" pitchFamily="34" charset="0"/>
+                <a:ea typeface="Calibri" panose="020F0502020204030204" pitchFamily="34" charset="0"/>
+                <a:cs typeface="Calibri" panose="020F0502020204030204" pitchFamily="34" charset="0"/>
+              </a:rPr>
+              <a:t>, D., Almeida, J. P. A., &amp; Prince Sales, T. (2022). </a:t>
+            </a:r>
+            <a:r>
+              <a:rPr lang="en-US" sz="2000" kern="100" dirty="0">
+                <a:effectLst/>
+                <a:latin typeface="Calibri" panose="020F0502020204030204" pitchFamily="34" charset="0"/>
+                <a:ea typeface="Calibri" panose="020F0502020204030204" pitchFamily="34" charset="0"/>
+                <a:cs typeface="Calibri" panose="020F0502020204030204" pitchFamily="34" charset="0"/>
+              </a:rPr>
+              <a:t>UFO: Unified Foundational Ontology. </a:t>
+            </a:r>
+            <a:r>
+              <a:rPr lang="en-US" sz="2000" i="1" kern="100" dirty="0">
+                <a:effectLst/>
+                <a:latin typeface="Calibri" panose="020F0502020204030204" pitchFamily="34" charset="0"/>
+                <a:ea typeface="Calibri" panose="020F0502020204030204" pitchFamily="34" charset="0"/>
+                <a:cs typeface="Calibri" panose="020F0502020204030204" pitchFamily="34" charset="0"/>
+              </a:rPr>
+              <a:t>Applied Ontology</a:t>
+            </a:r>
+            <a:r>
+              <a:rPr lang="en-US" sz="2000" kern="100" dirty="0">
+                <a:effectLst/>
+                <a:latin typeface="Calibri" panose="020F0502020204030204" pitchFamily="34" charset="0"/>
+                <a:ea typeface="Calibri" panose="020F0502020204030204" pitchFamily="34" charset="0"/>
+                <a:cs typeface="Calibri" panose="020F0502020204030204" pitchFamily="34" charset="0"/>
+              </a:rPr>
+              <a:t>, </a:t>
+            </a:r>
+            <a:r>
+              <a:rPr lang="en-US" sz="2000" i="1" kern="100" dirty="0">
+                <a:effectLst/>
+                <a:latin typeface="Calibri" panose="020F0502020204030204" pitchFamily="34" charset="0"/>
+                <a:ea typeface="Calibri" panose="020F0502020204030204" pitchFamily="34" charset="0"/>
+                <a:cs typeface="Calibri" panose="020F0502020204030204" pitchFamily="34" charset="0"/>
+              </a:rPr>
+              <a:t>17</a:t>
+            </a:r>
+            <a:r>
+              <a:rPr lang="en-US" sz="2000" kern="100" dirty="0">
+                <a:effectLst/>
+                <a:latin typeface="Calibri" panose="020F0502020204030204" pitchFamily="34" charset="0"/>
+                <a:ea typeface="Calibri" panose="020F0502020204030204" pitchFamily="34" charset="0"/>
+                <a:cs typeface="Calibri" panose="020F0502020204030204" pitchFamily="34" charset="0"/>
+              </a:rPr>
+              <a:t>(1), 167–210. </a:t>
+            </a:r>
+            <a:r>
+              <a:rPr lang="en-US" sz="2000" kern="100" dirty="0">
+                <a:effectLst/>
+                <a:latin typeface="Calibri" panose="020F0502020204030204" pitchFamily="34" charset="0"/>
+                <a:ea typeface="Calibri" panose="020F0502020204030204" pitchFamily="34" charset="0"/>
+                <a:cs typeface="Calibri" panose="020F0502020204030204" pitchFamily="34" charset="0"/>
+                <a:hlinkClick r:id="rId2"/>
+              </a:rPr>
+              <a:t>https://doi.org/10.3233/AO-210256</a:t>
+            </a:r>
+            <a:r>
+              <a:rPr lang="en-US" sz="2000" kern="100" dirty="0">
+                <a:effectLst/>
+                <a:latin typeface="Calibri" panose="020F0502020204030204" pitchFamily="34" charset="0"/>
+                <a:ea typeface="Calibri" panose="020F0502020204030204" pitchFamily="34" charset="0"/>
+                <a:cs typeface="Calibri" panose="020F0502020204030204" pitchFamily="34" charset="0"/>
+              </a:rPr>
+              <a:t> </a:t>
+            </a:r>
+            <a:endParaRPr lang="it-IT" sz="2000" kern="100" dirty="0">
+              <a:effectLst/>
+              <a:latin typeface="Calibri" panose="020F0502020204030204" pitchFamily="34" charset="0"/>
+              <a:ea typeface="Calibri" panose="020F0502020204030204" pitchFamily="34" charset="0"/>
+              <a:cs typeface="Calibri" panose="020F0502020204030204" pitchFamily="34" charset="0"/>
+            </a:endParaRPr>
+          </a:p>
+          <a:p>
+            <a:r>
+              <a:rPr lang="en-US" sz="2000" dirty="0">
+                <a:latin typeface="Calibri" panose="020F0502020204030204" pitchFamily="34" charset="0"/>
+                <a:ea typeface="Calibri" panose="020F0502020204030204" pitchFamily="34" charset="0"/>
+                <a:cs typeface="Calibri" panose="020F0502020204030204" pitchFamily="34" charset="0"/>
+                <a:hlinkClick r:id="rId3"/>
+              </a:rPr>
+              <a:t>https://nemo-ufes.github.io/gufo/#concreteindividuals</a:t>
+            </a:r>
+            <a:r>
+              <a:rPr lang="en-US" sz="2000" dirty="0">
+                <a:latin typeface="Calibri" panose="020F0502020204030204" pitchFamily="34" charset="0"/>
+                <a:ea typeface="Calibri" panose="020F0502020204030204" pitchFamily="34" charset="0"/>
+                <a:cs typeface="Calibri" panose="020F0502020204030204" pitchFamily="34" charset="0"/>
+              </a:rPr>
+              <a:t> +</a:t>
+            </a:r>
+            <a:r>
+              <a:rPr lang="en-US" sz="2000" dirty="0" err="1">
+                <a:latin typeface="Calibri" panose="020F0502020204030204" pitchFamily="34" charset="0"/>
+                <a:ea typeface="Calibri" panose="020F0502020204030204" pitchFamily="34" charset="0"/>
+                <a:cs typeface="Calibri" panose="020F0502020204030204" pitchFamily="34" charset="0"/>
+              </a:rPr>
+              <a:t>ttl</a:t>
+            </a:r>
+            <a:r>
+              <a:rPr lang="en-US" sz="2000" dirty="0">
+                <a:latin typeface="Calibri" panose="020F0502020204030204" pitchFamily="34" charset="0"/>
+                <a:ea typeface="Calibri" panose="020F0502020204030204" pitchFamily="34" charset="0"/>
+                <a:cs typeface="Calibri" panose="020F0502020204030204" pitchFamily="34" charset="0"/>
+              </a:rPr>
+              <a:t> file.</a:t>
+            </a:r>
+          </a:p>
+          <a:p>
+            <a:r>
+              <a:rPr lang="en-US" sz="2000" dirty="0">
+                <a:latin typeface="Calibri" panose="020F0502020204030204" pitchFamily="34" charset="0"/>
+                <a:ea typeface="Calibri" panose="020F0502020204030204" pitchFamily="34" charset="0"/>
+                <a:cs typeface="Calibri" panose="020F0502020204030204" pitchFamily="34" charset="0"/>
+              </a:rPr>
+              <a:t>COVER </a:t>
+            </a:r>
+            <a:r>
+              <a:rPr lang="en-US" sz="2000" dirty="0" err="1">
+                <a:latin typeface="Calibri" panose="020F0502020204030204" pitchFamily="34" charset="0"/>
+                <a:ea typeface="Calibri" panose="020F0502020204030204" pitchFamily="34" charset="0"/>
+                <a:cs typeface="Calibri" panose="020F0502020204030204" pitchFamily="34" charset="0"/>
+              </a:rPr>
+              <a:t>ttl</a:t>
+            </a:r>
+            <a:r>
+              <a:rPr lang="en-US" sz="2000" dirty="0">
+                <a:latin typeface="Calibri" panose="020F0502020204030204" pitchFamily="34" charset="0"/>
+                <a:ea typeface="Calibri" panose="020F0502020204030204" pitchFamily="34" charset="0"/>
+                <a:cs typeface="Calibri" panose="020F0502020204030204" pitchFamily="34" charset="0"/>
+              </a:rPr>
+              <a:t> file. </a:t>
+            </a:r>
           </a:p>
         </p:txBody>
       </p:sp>

</xml_diff>

<commit_message>
working on the slide deck
</commit_message>
<xml_diff>
--- a/SCO/working materials/Slide deck - SCO-UFO aligment.pptx
+++ b/SCO/working materials/Slide deck - SCO-UFO aligment.pptx
@@ -5,7 +5,7 @@
     <p:sldMasterId id="2147483648" r:id="rId1"/>
   </p:sldMasterIdLst>
   <p:notesMasterIdLst>
-    <p:notesMasterId r:id="rId11"/>
+    <p:notesMasterId r:id="rId15"/>
   </p:notesMasterIdLst>
   <p:sldIdLst>
     <p:sldId id="256" r:id="rId2"/>
@@ -13,10 +13,14 @@
     <p:sldId id="261" r:id="rId4"/>
     <p:sldId id="262" r:id="rId5"/>
     <p:sldId id="260" r:id="rId6"/>
-    <p:sldId id="257" r:id="rId7"/>
-    <p:sldId id="263" r:id="rId8"/>
-    <p:sldId id="264" r:id="rId9"/>
-    <p:sldId id="259" r:id="rId10"/>
+    <p:sldId id="265" r:id="rId7"/>
+    <p:sldId id="268" r:id="rId8"/>
+    <p:sldId id="266" r:id="rId9"/>
+    <p:sldId id="267" r:id="rId10"/>
+    <p:sldId id="269" r:id="rId11"/>
+    <p:sldId id="263" r:id="rId12"/>
+    <p:sldId id="264" r:id="rId13"/>
+    <p:sldId id="259" r:id="rId14"/>
   </p:sldIdLst>
   <p:sldSz cx="12192000" cy="6858000"/>
   <p:notesSz cx="6858000" cy="9144000"/>
@@ -3809,6 +3813,753 @@
 </p:sld>
 </file>
 
+<file path=ppt/slides/slide10.xml><?xml version="1.0" encoding="utf-8"?>
+<p:sld xmlns:a="http://schemas.openxmlformats.org/drawingml/2006/main" xmlns:r="http://schemas.openxmlformats.org/officeDocument/2006/relationships" xmlns:p="http://schemas.openxmlformats.org/presentationml/2006/main">
+  <p:cSld>
+    <p:spTree>
+      <p:nvGrpSpPr>
+        <p:cNvPr id="1" name=""/>
+        <p:cNvGrpSpPr/>
+        <p:nvPr/>
+      </p:nvGrpSpPr>
+      <p:grpSpPr>
+        <a:xfrm>
+          <a:off x="0" y="0"/>
+          <a:ext cx="0" cy="0"/>
+          <a:chOff x="0" y="0"/>
+          <a:chExt cx="0" cy="0"/>
+        </a:xfrm>
+      </p:grpSpPr>
+      <p:sp>
+        <p:nvSpPr>
+          <p:cNvPr id="2" name="Title 1">
+            <a:extLst>
+              <a:ext uri="{FF2B5EF4-FFF2-40B4-BE49-F238E27FC236}">
+                <a16:creationId xmlns:a16="http://schemas.microsoft.com/office/drawing/2014/main" id="{EAE9FFD8-9424-0C11-18D3-D097A17FE213}"/>
+              </a:ext>
+            </a:extLst>
+          </p:cNvPr>
+          <p:cNvSpPr>
+            <a:spLocks noGrp="1"/>
+          </p:cNvSpPr>
+          <p:nvPr>
+            <p:ph type="title"/>
+          </p:nvPr>
+        </p:nvSpPr>
+        <p:spPr/>
+        <p:txBody>
+          <a:bodyPr/>
+          <a:lstStyle/>
+          <a:p>
+            <a:r>
+              <a:rPr lang="en-US" sz="4400" dirty="0">
+                <a:solidFill>
+                  <a:srgbClr val="C00000"/>
+                </a:solidFill>
+                <a:latin typeface="Arial" panose="020B0604020202020204" pitchFamily="34" charset="0"/>
+                <a:cs typeface="Arial" panose="020B0604020202020204" pitchFamily="34" charset="0"/>
+              </a:rPr>
+              <a:t>work in progress</a:t>
+            </a:r>
+            <a:endParaRPr lang="it-IT" dirty="0"/>
+          </a:p>
+        </p:txBody>
+      </p:sp>
+      <p:sp>
+        <p:nvSpPr>
+          <p:cNvPr id="3" name="Content Placeholder 2">
+            <a:extLst>
+              <a:ext uri="{FF2B5EF4-FFF2-40B4-BE49-F238E27FC236}">
+                <a16:creationId xmlns:a16="http://schemas.microsoft.com/office/drawing/2014/main" id="{3797EF96-4B29-48AE-8113-94B25C2E630E}"/>
+              </a:ext>
+            </a:extLst>
+          </p:cNvPr>
+          <p:cNvSpPr>
+            <a:spLocks noGrp="1"/>
+          </p:cNvSpPr>
+          <p:nvPr>
+            <p:ph idx="1"/>
+          </p:nvPr>
+        </p:nvSpPr>
+        <p:spPr/>
+        <p:txBody>
+          <a:bodyPr>
+            <a:normAutofit/>
+          </a:bodyPr>
+          <a:lstStyle/>
+          <a:p>
+            <a:r>
+              <a:rPr lang="en-US" sz="2400" b="1" kern="100" dirty="0">
+                <a:latin typeface="Calibri" panose="020F0502020204030204" pitchFamily="34" charset="0"/>
+                <a:ea typeface="Aptos" panose="020B0004020202020204" pitchFamily="34" charset="0"/>
+                <a:cs typeface="Times New Roman" panose="02020603050405020304" pitchFamily="18" charset="0"/>
+              </a:rPr>
+              <a:t>Axiomatization </a:t>
+            </a:r>
+            <a:endParaRPr lang="en-US" sz="2400" b="1" kern="100" dirty="0">
+              <a:effectLst/>
+              <a:latin typeface="Calibri" panose="020F0502020204030204" pitchFamily="34" charset="0"/>
+              <a:ea typeface="Aptos" panose="020B0004020202020204" pitchFamily="34" charset="0"/>
+              <a:cs typeface="Times New Roman" panose="02020603050405020304" pitchFamily="18" charset="0"/>
+            </a:endParaRPr>
+          </a:p>
+        </p:txBody>
+      </p:sp>
+    </p:spTree>
+    <p:extLst>
+      <p:ext uri="{BB962C8B-B14F-4D97-AF65-F5344CB8AC3E}">
+        <p14:creationId xmlns:p14="http://schemas.microsoft.com/office/powerpoint/2010/main" val="2713080875"/>
+      </p:ext>
+    </p:extLst>
+  </p:cSld>
+  <p:clrMapOvr>
+    <a:masterClrMapping/>
+  </p:clrMapOvr>
+</p:sld>
+</file>
+
+<file path=ppt/slides/slide11.xml><?xml version="1.0" encoding="utf-8"?>
+<p:sld xmlns:a="http://schemas.openxmlformats.org/drawingml/2006/main" xmlns:r="http://schemas.openxmlformats.org/officeDocument/2006/relationships" xmlns:p="http://schemas.openxmlformats.org/presentationml/2006/main">
+  <p:cSld>
+    <p:spTree>
+      <p:nvGrpSpPr>
+        <p:cNvPr id="1" name="">
+          <a:extLst>
+            <a:ext uri="{FF2B5EF4-FFF2-40B4-BE49-F238E27FC236}">
+              <a16:creationId xmlns:a16="http://schemas.microsoft.com/office/drawing/2014/main" id="{540F39BC-4001-EC40-3789-A8240B3FC51D}"/>
+            </a:ext>
+          </a:extLst>
+        </p:cNvPr>
+        <p:cNvGrpSpPr/>
+        <p:nvPr/>
+      </p:nvGrpSpPr>
+      <p:grpSpPr>
+        <a:xfrm>
+          <a:off x="0" y="0"/>
+          <a:ext cx="0" cy="0"/>
+          <a:chOff x="0" y="0"/>
+          <a:chExt cx="0" cy="0"/>
+        </a:xfrm>
+      </p:grpSpPr>
+      <p:sp>
+        <p:nvSpPr>
+          <p:cNvPr id="2" name="Title 1">
+            <a:extLst>
+              <a:ext uri="{FF2B5EF4-FFF2-40B4-BE49-F238E27FC236}">
+                <a16:creationId xmlns:a16="http://schemas.microsoft.com/office/drawing/2014/main" id="{42F46146-8CE5-7E2B-35A8-0A3AEC6002D7}"/>
+              </a:ext>
+            </a:extLst>
+          </p:cNvPr>
+          <p:cNvSpPr>
+            <a:spLocks noGrp="1"/>
+          </p:cNvSpPr>
+          <p:nvPr>
+            <p:ph type="title"/>
+          </p:nvPr>
+        </p:nvSpPr>
+        <p:spPr/>
+        <p:txBody>
+          <a:bodyPr>
+            <a:normAutofit/>
+          </a:bodyPr>
+          <a:lstStyle/>
+          <a:p>
+            <a:r>
+              <a:rPr lang="en-US" sz="3600" dirty="0">
+                <a:latin typeface="Arial" panose="020B0604020202020204" pitchFamily="34" charset="0"/>
+                <a:cs typeface="Arial" panose="020B0604020202020204" pitchFamily="34" charset="0"/>
+              </a:rPr>
+              <a:t>Example: Complex System, Components, and Interactions.</a:t>
+            </a:r>
+            <a:endParaRPr lang="it-IT" sz="3600" dirty="0">
+              <a:latin typeface="Arial" panose="020B0604020202020204" pitchFamily="34" charset="0"/>
+              <a:cs typeface="Arial" panose="020B0604020202020204" pitchFamily="34" charset="0"/>
+            </a:endParaRPr>
+          </a:p>
+        </p:txBody>
+      </p:sp>
+      <p:sp>
+        <p:nvSpPr>
+          <p:cNvPr id="8" name="TextBox 7">
+            <a:extLst>
+              <a:ext uri="{FF2B5EF4-FFF2-40B4-BE49-F238E27FC236}">
+                <a16:creationId xmlns:a16="http://schemas.microsoft.com/office/drawing/2014/main" id="{E884D0D0-3BF8-5A02-F68B-FCC859904423}"/>
+              </a:ext>
+            </a:extLst>
+          </p:cNvPr>
+          <p:cNvSpPr txBox="1"/>
+          <p:nvPr/>
+        </p:nvSpPr>
+        <p:spPr>
+          <a:xfrm>
+            <a:off x="838200" y="6123543"/>
+            <a:ext cx="9224387" cy="369332"/>
+          </a:xfrm>
+          <a:prstGeom prst="rect">
+            <a:avLst/>
+          </a:prstGeom>
+          <a:noFill/>
+        </p:spPr>
+        <p:txBody>
+          <a:bodyPr wrap="square" rtlCol="0">
+            <a:spAutoFit/>
+          </a:bodyPr>
+          <a:lstStyle/>
+          <a:p>
+            <a:r>
+              <a:rPr lang="en-US" dirty="0">
+                <a:latin typeface="Calibri" panose="020F0502020204030204" pitchFamily="34" charset="0"/>
+                <a:ea typeface="Calibri" panose="020F0502020204030204" pitchFamily="34" charset="0"/>
+                <a:cs typeface="Calibri" panose="020F0502020204030204" pitchFamily="34" charset="0"/>
+              </a:rPr>
+              <a:t>The SCO representation that is BFO compliant. We omitted intermediate classes.</a:t>
+            </a:r>
+            <a:endParaRPr lang="it-IT" dirty="0">
+              <a:latin typeface="Calibri" panose="020F0502020204030204" pitchFamily="34" charset="0"/>
+              <a:ea typeface="Calibri" panose="020F0502020204030204" pitchFamily="34" charset="0"/>
+              <a:cs typeface="Calibri" panose="020F0502020204030204" pitchFamily="34" charset="0"/>
+            </a:endParaRPr>
+          </a:p>
+        </p:txBody>
+      </p:sp>
+      <p:pic>
+        <p:nvPicPr>
+          <p:cNvPr id="6" name="Picture 5">
+            <a:extLst>
+              <a:ext uri="{FF2B5EF4-FFF2-40B4-BE49-F238E27FC236}">
+                <a16:creationId xmlns:a16="http://schemas.microsoft.com/office/drawing/2014/main" id="{E5C734C1-45B5-76BD-1D99-67E17F9D3F4A}"/>
+              </a:ext>
+            </a:extLst>
+          </p:cNvPr>
+          <p:cNvPicPr>
+            <a:picLocks noChangeAspect="1"/>
+          </p:cNvPicPr>
+          <p:nvPr/>
+        </p:nvPicPr>
+        <p:blipFill>
+          <a:blip r:embed="rId2"/>
+          <a:stretch>
+            <a:fillRect/>
+          </a:stretch>
+        </p:blipFill>
+        <p:spPr>
+          <a:xfrm>
+            <a:off x="451888" y="1790558"/>
+            <a:ext cx="11469094" cy="3276884"/>
+          </a:xfrm>
+          <a:prstGeom prst="rect">
+            <a:avLst/>
+          </a:prstGeom>
+        </p:spPr>
+      </p:pic>
+    </p:spTree>
+    <p:extLst>
+      <p:ext uri="{BB962C8B-B14F-4D97-AF65-F5344CB8AC3E}">
+        <p14:creationId xmlns:p14="http://schemas.microsoft.com/office/powerpoint/2010/main" val="3743612181"/>
+      </p:ext>
+    </p:extLst>
+  </p:cSld>
+  <p:clrMapOvr>
+    <a:masterClrMapping/>
+  </p:clrMapOvr>
+</p:sld>
+</file>
+
+<file path=ppt/slides/slide12.xml><?xml version="1.0" encoding="utf-8"?>
+<p:sld xmlns:a="http://schemas.openxmlformats.org/drawingml/2006/main" xmlns:r="http://schemas.openxmlformats.org/officeDocument/2006/relationships" xmlns:p="http://schemas.openxmlformats.org/presentationml/2006/main">
+  <p:cSld>
+    <p:spTree>
+      <p:nvGrpSpPr>
+        <p:cNvPr id="1" name=""/>
+        <p:cNvGrpSpPr/>
+        <p:nvPr/>
+      </p:nvGrpSpPr>
+      <p:grpSpPr>
+        <a:xfrm>
+          <a:off x="0" y="0"/>
+          <a:ext cx="0" cy="0"/>
+          <a:chOff x="0" y="0"/>
+          <a:chExt cx="0" cy="0"/>
+        </a:xfrm>
+      </p:grpSpPr>
+      <p:sp>
+        <p:nvSpPr>
+          <p:cNvPr id="2" name="Title 1">
+            <a:extLst>
+              <a:ext uri="{FF2B5EF4-FFF2-40B4-BE49-F238E27FC236}">
+                <a16:creationId xmlns:a16="http://schemas.microsoft.com/office/drawing/2014/main" id="{74599347-6F32-A7D6-9DC9-C494086F5C21}"/>
+              </a:ext>
+            </a:extLst>
+          </p:cNvPr>
+          <p:cNvSpPr>
+            <a:spLocks noGrp="1"/>
+          </p:cNvSpPr>
+          <p:nvPr>
+            <p:ph type="title"/>
+          </p:nvPr>
+        </p:nvSpPr>
+        <p:spPr>
+          <a:xfrm>
+            <a:off x="838200" y="307294"/>
+            <a:ext cx="10515600" cy="1325563"/>
+          </a:xfrm>
+        </p:spPr>
+        <p:txBody>
+          <a:bodyPr/>
+          <a:lstStyle/>
+          <a:p>
+            <a:r>
+              <a:rPr lang="en-US" dirty="0">
+                <a:solidFill>
+                  <a:srgbClr val="C00000"/>
+                </a:solidFill>
+              </a:rPr>
+              <a:t>Work in progress</a:t>
+            </a:r>
+            <a:endParaRPr lang="it-IT" dirty="0">
+              <a:solidFill>
+                <a:srgbClr val="C00000"/>
+              </a:solidFill>
+            </a:endParaRPr>
+          </a:p>
+        </p:txBody>
+      </p:sp>
+      <p:sp>
+        <p:nvSpPr>
+          <p:cNvPr id="4" name="TextBox 3">
+            <a:extLst>
+              <a:ext uri="{FF2B5EF4-FFF2-40B4-BE49-F238E27FC236}">
+                <a16:creationId xmlns:a16="http://schemas.microsoft.com/office/drawing/2014/main" id="{6AA6BAE8-90DB-F535-920B-532B229EC667}"/>
+              </a:ext>
+            </a:extLst>
+          </p:cNvPr>
+          <p:cNvSpPr txBox="1"/>
+          <p:nvPr/>
+        </p:nvSpPr>
+        <p:spPr>
+          <a:xfrm>
+            <a:off x="838200" y="6123543"/>
+            <a:ext cx="9224387" cy="369332"/>
+          </a:xfrm>
+          <a:prstGeom prst="rect">
+            <a:avLst/>
+          </a:prstGeom>
+          <a:noFill/>
+        </p:spPr>
+        <p:txBody>
+          <a:bodyPr wrap="square" rtlCol="0">
+            <a:spAutoFit/>
+          </a:bodyPr>
+          <a:lstStyle/>
+          <a:p>
+            <a:r>
+              <a:rPr lang="en-US" dirty="0">
+                <a:latin typeface="Calibri" panose="020F0502020204030204" pitchFamily="34" charset="0"/>
+                <a:ea typeface="Calibri" panose="020F0502020204030204" pitchFamily="34" charset="0"/>
+                <a:cs typeface="Calibri" panose="020F0502020204030204" pitchFamily="34" charset="0"/>
+              </a:rPr>
+              <a:t>The SCO representation that is BFO and UFO compliant.</a:t>
+            </a:r>
+            <a:endParaRPr lang="it-IT" dirty="0">
+              <a:latin typeface="Calibri" panose="020F0502020204030204" pitchFamily="34" charset="0"/>
+              <a:ea typeface="Calibri" panose="020F0502020204030204" pitchFamily="34" charset="0"/>
+              <a:cs typeface="Calibri" panose="020F0502020204030204" pitchFamily="34" charset="0"/>
+            </a:endParaRPr>
+          </a:p>
+        </p:txBody>
+      </p:sp>
+      <p:pic>
+        <p:nvPicPr>
+          <p:cNvPr id="6" name="Picture 5">
+            <a:extLst>
+              <a:ext uri="{FF2B5EF4-FFF2-40B4-BE49-F238E27FC236}">
+                <a16:creationId xmlns:a16="http://schemas.microsoft.com/office/drawing/2014/main" id="{2E7E06AC-7721-C2E2-333B-A4623E12FFD1}"/>
+              </a:ext>
+            </a:extLst>
+          </p:cNvPr>
+          <p:cNvPicPr>
+            <a:picLocks noChangeAspect="1"/>
+          </p:cNvPicPr>
+          <p:nvPr/>
+        </p:nvPicPr>
+        <p:blipFill>
+          <a:blip r:embed="rId2"/>
+          <a:srcRect l="2637" t="14408" b="19153"/>
+          <a:stretch/>
+        </p:blipFill>
+        <p:spPr>
+          <a:xfrm>
+            <a:off x="160773" y="1632857"/>
+            <a:ext cx="11870453" cy="3868616"/>
+          </a:xfrm>
+          <a:prstGeom prst="rect">
+            <a:avLst/>
+          </a:prstGeom>
+        </p:spPr>
+      </p:pic>
+    </p:spTree>
+    <p:extLst>
+      <p:ext uri="{BB962C8B-B14F-4D97-AF65-F5344CB8AC3E}">
+        <p14:creationId xmlns:p14="http://schemas.microsoft.com/office/powerpoint/2010/main" val="936711700"/>
+      </p:ext>
+    </p:extLst>
+  </p:cSld>
+  <p:clrMapOvr>
+    <a:masterClrMapping/>
+  </p:clrMapOvr>
+</p:sld>
+</file>
+
+<file path=ppt/slides/slide13.xml><?xml version="1.0" encoding="utf-8"?>
+<p:sld xmlns:a="http://schemas.openxmlformats.org/drawingml/2006/main" xmlns:r="http://schemas.openxmlformats.org/officeDocument/2006/relationships" xmlns:p="http://schemas.openxmlformats.org/presentationml/2006/main">
+  <p:cSld>
+    <p:spTree>
+      <p:nvGrpSpPr>
+        <p:cNvPr id="1" name="">
+          <a:extLst>
+            <a:ext uri="{FF2B5EF4-FFF2-40B4-BE49-F238E27FC236}">
+              <a16:creationId xmlns:a16="http://schemas.microsoft.com/office/drawing/2014/main" id="{56E886F1-CB7B-2D8F-1455-67B55D64B2FB}"/>
+            </a:ext>
+          </a:extLst>
+        </p:cNvPr>
+        <p:cNvGrpSpPr/>
+        <p:nvPr/>
+      </p:nvGrpSpPr>
+      <p:grpSpPr>
+        <a:xfrm>
+          <a:off x="0" y="0"/>
+          <a:ext cx="0" cy="0"/>
+          <a:chOff x="0" y="0"/>
+          <a:chExt cx="0" cy="0"/>
+        </a:xfrm>
+      </p:grpSpPr>
+      <p:sp>
+        <p:nvSpPr>
+          <p:cNvPr id="2" name="Title 1">
+            <a:extLst>
+              <a:ext uri="{FF2B5EF4-FFF2-40B4-BE49-F238E27FC236}">
+                <a16:creationId xmlns:a16="http://schemas.microsoft.com/office/drawing/2014/main" id="{4CA52769-B2EA-5315-47B3-47BA7FB0BB6E}"/>
+              </a:ext>
+            </a:extLst>
+          </p:cNvPr>
+          <p:cNvSpPr>
+            <a:spLocks noGrp="1"/>
+          </p:cNvSpPr>
+          <p:nvPr>
+            <p:ph type="title"/>
+          </p:nvPr>
+        </p:nvSpPr>
+        <p:spPr/>
+        <p:txBody>
+          <a:bodyPr>
+            <a:normAutofit/>
+          </a:bodyPr>
+          <a:lstStyle/>
+          <a:p>
+            <a:r>
+              <a:rPr lang="en-US" dirty="0">
+                <a:latin typeface="Arial" panose="020B0604020202020204" pitchFamily="34" charset="0"/>
+                <a:cs typeface="Arial" panose="020B0604020202020204" pitchFamily="34" charset="0"/>
+              </a:rPr>
+              <a:t>References </a:t>
+            </a:r>
+            <a:endParaRPr lang="it-IT" dirty="0">
+              <a:latin typeface="Arial" panose="020B0604020202020204" pitchFamily="34" charset="0"/>
+              <a:cs typeface="Arial" panose="020B0604020202020204" pitchFamily="34" charset="0"/>
+            </a:endParaRPr>
+          </a:p>
+        </p:txBody>
+      </p:sp>
+      <p:sp>
+        <p:nvSpPr>
+          <p:cNvPr id="9" name="Content Placeholder 2">
+            <a:extLst>
+              <a:ext uri="{FF2B5EF4-FFF2-40B4-BE49-F238E27FC236}">
+                <a16:creationId xmlns:a16="http://schemas.microsoft.com/office/drawing/2014/main" id="{FD700632-7E70-F24B-4874-0356A04AA681}"/>
+              </a:ext>
+            </a:extLst>
+          </p:cNvPr>
+          <p:cNvSpPr>
+            <a:spLocks noGrp="1"/>
+          </p:cNvSpPr>
+          <p:nvPr>
+            <p:ph idx="1"/>
+          </p:nvPr>
+        </p:nvSpPr>
+        <p:spPr>
+          <a:xfrm>
+            <a:off x="838200" y="1825625"/>
+            <a:ext cx="10515600" cy="4351338"/>
+          </a:xfrm>
+        </p:spPr>
+        <p:txBody>
+          <a:bodyPr>
+            <a:normAutofit/>
+          </a:bodyPr>
+          <a:lstStyle/>
+          <a:p>
+            <a:pPr>
+              <a:lnSpc>
+                <a:spcPct val="107000"/>
+              </a:lnSpc>
+              <a:spcAft>
+                <a:spcPts val="800"/>
+              </a:spcAft>
+            </a:pPr>
+            <a:r>
+              <a:rPr lang="en-US" sz="2000" kern="100" dirty="0">
+                <a:effectLst/>
+                <a:latin typeface="Calibri" panose="020F0502020204030204" pitchFamily="34" charset="0"/>
+                <a:ea typeface="Calibri" panose="020F0502020204030204" pitchFamily="34" charset="0"/>
+                <a:cs typeface="Calibri" panose="020F0502020204030204" pitchFamily="34" charset="0"/>
+              </a:rPr>
+              <a:t>Arp, R., Smith, B., &amp; Spear, A. D. (2015). </a:t>
+            </a:r>
+            <a:r>
+              <a:rPr lang="en-US" sz="2000" i="1" kern="100" dirty="0">
+                <a:effectLst/>
+                <a:latin typeface="Calibri" panose="020F0502020204030204" pitchFamily="34" charset="0"/>
+                <a:ea typeface="Calibri" panose="020F0502020204030204" pitchFamily="34" charset="0"/>
+                <a:cs typeface="Calibri" panose="020F0502020204030204" pitchFamily="34" charset="0"/>
+              </a:rPr>
+              <a:t>Building ontologies with Basic Formal Ontology</a:t>
+            </a:r>
+            <a:r>
+              <a:rPr lang="en-US" sz="2000" kern="100" dirty="0">
+                <a:effectLst/>
+                <a:latin typeface="Calibri" panose="020F0502020204030204" pitchFamily="34" charset="0"/>
+                <a:ea typeface="Calibri" panose="020F0502020204030204" pitchFamily="34" charset="0"/>
+                <a:cs typeface="Calibri" panose="020F0502020204030204" pitchFamily="34" charset="0"/>
+              </a:rPr>
+              <a:t>. Massachusetts Institute of Technology.</a:t>
+            </a:r>
+            <a:endParaRPr lang="it-IT" sz="2000" kern="100" dirty="0">
+              <a:effectLst/>
+              <a:latin typeface="Calibri" panose="020F0502020204030204" pitchFamily="34" charset="0"/>
+              <a:ea typeface="Calibri" panose="020F0502020204030204" pitchFamily="34" charset="0"/>
+              <a:cs typeface="Calibri" panose="020F0502020204030204" pitchFamily="34" charset="0"/>
+            </a:endParaRPr>
+          </a:p>
+          <a:p>
+            <a:pPr>
+              <a:lnSpc>
+                <a:spcPct val="107000"/>
+              </a:lnSpc>
+              <a:spcAft>
+                <a:spcPts val="800"/>
+              </a:spcAft>
+            </a:pPr>
+            <a:r>
+              <a:rPr lang="it-IT" sz="2000" kern="100" dirty="0">
+                <a:effectLst/>
+                <a:latin typeface="Calibri" panose="020F0502020204030204" pitchFamily="34" charset="0"/>
+                <a:ea typeface="Calibri" panose="020F0502020204030204" pitchFamily="34" charset="0"/>
+                <a:cs typeface="Calibri" panose="020F0502020204030204" pitchFamily="34" charset="0"/>
+              </a:rPr>
+              <a:t>Guizzardi, G., Botti </a:t>
+            </a:r>
+            <a:r>
+              <a:rPr lang="it-IT" sz="2000" kern="100" dirty="0" err="1">
+                <a:effectLst/>
+                <a:latin typeface="Calibri" panose="020F0502020204030204" pitchFamily="34" charset="0"/>
+                <a:ea typeface="Calibri" panose="020F0502020204030204" pitchFamily="34" charset="0"/>
+                <a:cs typeface="Calibri" panose="020F0502020204030204" pitchFamily="34" charset="0"/>
+              </a:rPr>
+              <a:t>Benevides</a:t>
+            </a:r>
+            <a:r>
+              <a:rPr lang="it-IT" sz="2000" kern="100" dirty="0">
+                <a:effectLst/>
+                <a:latin typeface="Calibri" panose="020F0502020204030204" pitchFamily="34" charset="0"/>
+                <a:ea typeface="Calibri" panose="020F0502020204030204" pitchFamily="34" charset="0"/>
+                <a:cs typeface="Calibri" panose="020F0502020204030204" pitchFamily="34" charset="0"/>
+              </a:rPr>
+              <a:t>, A., Fonseca, C. M., </a:t>
+            </a:r>
+            <a:r>
+              <a:rPr lang="it-IT" sz="2000" kern="100" dirty="0" err="1">
+                <a:effectLst/>
+                <a:latin typeface="Calibri" panose="020F0502020204030204" pitchFamily="34" charset="0"/>
+                <a:ea typeface="Calibri" panose="020F0502020204030204" pitchFamily="34" charset="0"/>
+                <a:cs typeface="Calibri" panose="020F0502020204030204" pitchFamily="34" charset="0"/>
+              </a:rPr>
+              <a:t>Porello</a:t>
+            </a:r>
+            <a:r>
+              <a:rPr lang="it-IT" sz="2000" kern="100" dirty="0">
+                <a:effectLst/>
+                <a:latin typeface="Calibri" panose="020F0502020204030204" pitchFamily="34" charset="0"/>
+                <a:ea typeface="Calibri" panose="020F0502020204030204" pitchFamily="34" charset="0"/>
+                <a:cs typeface="Calibri" panose="020F0502020204030204" pitchFamily="34" charset="0"/>
+              </a:rPr>
+              <a:t>, D., Almeida, J. P. A., &amp; Prince Sales, T. (2022). </a:t>
+            </a:r>
+            <a:r>
+              <a:rPr lang="en-US" sz="2000" kern="100" dirty="0">
+                <a:effectLst/>
+                <a:latin typeface="Calibri" panose="020F0502020204030204" pitchFamily="34" charset="0"/>
+                <a:ea typeface="Calibri" panose="020F0502020204030204" pitchFamily="34" charset="0"/>
+                <a:cs typeface="Calibri" panose="020F0502020204030204" pitchFamily="34" charset="0"/>
+              </a:rPr>
+              <a:t>UFO: Unified Foundational Ontology. </a:t>
+            </a:r>
+            <a:r>
+              <a:rPr lang="en-US" sz="2000" i="1" kern="100" dirty="0">
+                <a:effectLst/>
+                <a:latin typeface="Calibri" panose="020F0502020204030204" pitchFamily="34" charset="0"/>
+                <a:ea typeface="Calibri" panose="020F0502020204030204" pitchFamily="34" charset="0"/>
+                <a:cs typeface="Calibri" panose="020F0502020204030204" pitchFamily="34" charset="0"/>
+              </a:rPr>
+              <a:t>Applied Ontology</a:t>
+            </a:r>
+            <a:r>
+              <a:rPr lang="en-US" sz="2000" kern="100" dirty="0">
+                <a:effectLst/>
+                <a:latin typeface="Calibri" panose="020F0502020204030204" pitchFamily="34" charset="0"/>
+                <a:ea typeface="Calibri" panose="020F0502020204030204" pitchFamily="34" charset="0"/>
+                <a:cs typeface="Calibri" panose="020F0502020204030204" pitchFamily="34" charset="0"/>
+              </a:rPr>
+              <a:t>, </a:t>
+            </a:r>
+            <a:r>
+              <a:rPr lang="en-US" sz="2000" i="1" kern="100" dirty="0">
+                <a:effectLst/>
+                <a:latin typeface="Calibri" panose="020F0502020204030204" pitchFamily="34" charset="0"/>
+                <a:ea typeface="Calibri" panose="020F0502020204030204" pitchFamily="34" charset="0"/>
+                <a:cs typeface="Calibri" panose="020F0502020204030204" pitchFamily="34" charset="0"/>
+              </a:rPr>
+              <a:t>17</a:t>
+            </a:r>
+            <a:r>
+              <a:rPr lang="en-US" sz="2000" kern="100" dirty="0">
+                <a:effectLst/>
+                <a:latin typeface="Calibri" panose="020F0502020204030204" pitchFamily="34" charset="0"/>
+                <a:ea typeface="Calibri" panose="020F0502020204030204" pitchFamily="34" charset="0"/>
+                <a:cs typeface="Calibri" panose="020F0502020204030204" pitchFamily="34" charset="0"/>
+              </a:rPr>
+              <a:t>(1), 167–210. </a:t>
+            </a:r>
+            <a:r>
+              <a:rPr lang="en-US" sz="2000" kern="100" dirty="0">
+                <a:effectLst/>
+                <a:latin typeface="Calibri" panose="020F0502020204030204" pitchFamily="34" charset="0"/>
+                <a:ea typeface="Calibri" panose="020F0502020204030204" pitchFamily="34" charset="0"/>
+                <a:cs typeface="Calibri" panose="020F0502020204030204" pitchFamily="34" charset="0"/>
+                <a:hlinkClick r:id="rId2"/>
+              </a:rPr>
+              <a:t>https://doi.org/10.3233/AO-210256</a:t>
+            </a:r>
+            <a:r>
+              <a:rPr lang="en-US" sz="2000" kern="100" dirty="0">
+                <a:effectLst/>
+                <a:latin typeface="Calibri" panose="020F0502020204030204" pitchFamily="34" charset="0"/>
+                <a:ea typeface="Calibri" panose="020F0502020204030204" pitchFamily="34" charset="0"/>
+                <a:cs typeface="Calibri" panose="020F0502020204030204" pitchFamily="34" charset="0"/>
+              </a:rPr>
+              <a:t> </a:t>
+            </a:r>
+          </a:p>
+          <a:p>
+            <a:pPr>
+              <a:lnSpc>
+                <a:spcPct val="107000"/>
+              </a:lnSpc>
+              <a:spcAft>
+                <a:spcPts val="800"/>
+              </a:spcAft>
+            </a:pPr>
+            <a:r>
+              <a:rPr lang="en-US" sz="2000" kern="100" dirty="0">
+                <a:latin typeface="Calibri" panose="020F0502020204030204" pitchFamily="34" charset="0"/>
+                <a:ea typeface="Calibri" panose="020F0502020204030204" pitchFamily="34" charset="0"/>
+                <a:cs typeface="Calibri" panose="020F0502020204030204" pitchFamily="34" charset="0"/>
+                <a:hlinkClick r:id="rId3"/>
+              </a:rPr>
+              <a:t>gUFO</a:t>
+            </a:r>
+            <a:r>
+              <a:rPr lang="it-IT" sz="2000" kern="100" dirty="0">
+                <a:latin typeface="Calibri" panose="020F0502020204030204" pitchFamily="34" charset="0"/>
+                <a:ea typeface="Calibri" panose="020F0502020204030204" pitchFamily="34" charset="0"/>
+                <a:cs typeface="Calibri" panose="020F0502020204030204" pitchFamily="34" charset="0"/>
+              </a:rPr>
+              <a:t> </a:t>
+            </a:r>
+            <a:r>
+              <a:rPr lang="en-US" sz="2000" dirty="0">
+                <a:latin typeface="Calibri" panose="020F0502020204030204" pitchFamily="34" charset="0"/>
+                <a:ea typeface="Calibri" panose="020F0502020204030204" pitchFamily="34" charset="0"/>
+                <a:cs typeface="Calibri" panose="020F0502020204030204" pitchFamily="34" charset="0"/>
+              </a:rPr>
+              <a:t>and </a:t>
+            </a:r>
+            <a:r>
+              <a:rPr lang="en-US" sz="2000" dirty="0" err="1">
+                <a:latin typeface="Calibri" panose="020F0502020204030204" pitchFamily="34" charset="0"/>
+                <a:ea typeface="Calibri" panose="020F0502020204030204" pitchFamily="34" charset="0"/>
+                <a:cs typeface="Calibri" panose="020F0502020204030204" pitchFamily="34" charset="0"/>
+              </a:rPr>
+              <a:t>gUFO.ttl</a:t>
+            </a:r>
+            <a:r>
+              <a:rPr lang="en-US" sz="2000" dirty="0">
+                <a:latin typeface="Calibri" panose="020F0502020204030204" pitchFamily="34" charset="0"/>
+                <a:ea typeface="Calibri" panose="020F0502020204030204" pitchFamily="34" charset="0"/>
+                <a:cs typeface="Calibri" panose="020F0502020204030204" pitchFamily="34" charset="0"/>
+              </a:rPr>
+              <a:t>.</a:t>
+            </a:r>
+          </a:p>
+          <a:p>
+            <a:r>
+              <a:rPr lang="en-US" sz="2000" dirty="0">
+                <a:latin typeface="Calibri" panose="020F0502020204030204" pitchFamily="34" charset="0"/>
+                <a:ea typeface="Calibri" panose="020F0502020204030204" pitchFamily="34" charset="0"/>
+                <a:cs typeface="Calibri" panose="020F0502020204030204" pitchFamily="34" charset="0"/>
+                <a:hlinkClick r:id="rId4"/>
+              </a:rPr>
+              <a:t>COVER </a:t>
+            </a:r>
+            <a:r>
+              <a:rPr lang="en-US" sz="2000" dirty="0">
+                <a:latin typeface="Calibri" panose="020F0502020204030204" pitchFamily="34" charset="0"/>
+                <a:ea typeface="Calibri" panose="020F0502020204030204" pitchFamily="34" charset="0"/>
+                <a:cs typeface="Calibri" panose="020F0502020204030204" pitchFamily="34" charset="0"/>
+              </a:rPr>
+              <a:t>(</a:t>
+            </a:r>
+            <a:r>
+              <a:rPr lang="en-US" sz="2000" dirty="0" err="1">
+                <a:latin typeface="Calibri" panose="020F0502020204030204" pitchFamily="34" charset="0"/>
+                <a:ea typeface="Calibri" panose="020F0502020204030204" pitchFamily="34" charset="0"/>
+                <a:cs typeface="Calibri" panose="020F0502020204030204" pitchFamily="34" charset="0"/>
+              </a:rPr>
+              <a:t>COVER.ttl</a:t>
+            </a:r>
+            <a:r>
+              <a:rPr lang="en-US" sz="2000" dirty="0">
+                <a:latin typeface="Calibri" panose="020F0502020204030204" pitchFamily="34" charset="0"/>
+                <a:ea typeface="Calibri" panose="020F0502020204030204" pitchFamily="34" charset="0"/>
+                <a:cs typeface="Calibri" panose="020F0502020204030204" pitchFamily="34" charset="0"/>
+              </a:rPr>
+              <a:t>). </a:t>
+            </a:r>
+          </a:p>
+        </p:txBody>
+      </p:sp>
+    </p:spTree>
+    <p:extLst>
+      <p:ext uri="{BB962C8B-B14F-4D97-AF65-F5344CB8AC3E}">
+        <p14:creationId xmlns:p14="http://schemas.microsoft.com/office/powerpoint/2010/main" val="2123806945"/>
+      </p:ext>
+    </p:extLst>
+  </p:cSld>
+  <p:clrMapOvr>
+    <a:masterClrMapping/>
+  </p:clrMapOvr>
+</p:sld>
+</file>
+
 <file path=ppt/slides/slide2.xml><?xml version="1.0" encoding="utf-8"?>
 <p:sld xmlns:a="http://schemas.openxmlformats.org/drawingml/2006/main" xmlns:r="http://schemas.openxmlformats.org/officeDocument/2006/relationships" xmlns:p="http://schemas.openxmlformats.org/presentationml/2006/main">
   <p:cSld>
@@ -3960,7 +4711,7 @@
               <a:t>UFO OWL version: </a:t>
             </a:r>
             <a:r>
-              <a:rPr lang="en-US" dirty="0" err="1">
+              <a:rPr lang="en-US" dirty="0">
                 <a:latin typeface="Calibri" panose="020F0502020204030204" pitchFamily="34" charset="0"/>
                 <a:ea typeface="Calibri" panose="020F0502020204030204" pitchFamily="34" charset="0"/>
                 <a:cs typeface="Calibri" panose="020F0502020204030204" pitchFamily="34" charset="0"/>
@@ -4462,7 +5213,7 @@
           <a:lstStyle/>
           <a:p>
             <a:r>
-              <a:rPr lang="en-US" dirty="0" err="1">
+              <a:rPr lang="en-US" dirty="0">
                 <a:latin typeface="Calibri" panose="020F0502020204030204" pitchFamily="34" charset="0"/>
                 <a:ea typeface="Calibri" panose="020F0502020204030204" pitchFamily="34" charset="0"/>
                 <a:cs typeface="Calibri" panose="020F0502020204030204" pitchFamily="34" charset="0"/>
@@ -4581,7 +5332,13 @@
   <p:cSld>
     <p:spTree>
       <p:nvGrpSpPr>
-        <p:cNvPr id="1" name=""/>
+        <p:cNvPr id="1" name="">
+          <a:extLst>
+            <a:ext uri="{FF2B5EF4-FFF2-40B4-BE49-F238E27FC236}">
+              <a16:creationId xmlns:a16="http://schemas.microsoft.com/office/drawing/2014/main" id="{6C1132B0-3227-4D0B-4C1B-0D7FF62861CF}"/>
+            </a:ext>
+          </a:extLst>
+        </p:cNvPr>
         <p:cNvGrpSpPr/>
         <p:nvPr/>
       </p:nvGrpSpPr>
@@ -4598,7 +5355,7 @@
           <p:cNvPr id="2" name="Title 1">
             <a:extLst>
               <a:ext uri="{FF2B5EF4-FFF2-40B4-BE49-F238E27FC236}">
-                <a16:creationId xmlns:a16="http://schemas.microsoft.com/office/drawing/2014/main" id="{F1CFA2B5-87F1-14ED-0B9F-D15C48888AFC}"/>
+                <a16:creationId xmlns:a16="http://schemas.microsoft.com/office/drawing/2014/main" id="{B5A6DC75-E6C9-42B0-81BD-C7B85B886B08}"/>
               </a:ext>
             </a:extLst>
           </p:cNvPr>
@@ -4611,17 +5368,36 @@
         </p:nvSpPr>
         <p:spPr/>
         <p:txBody>
-          <a:bodyPr/>
-          <a:lstStyle/>
-          <a:p>
-            <a:r>
-              <a:rPr lang="en-US" dirty="0">
+          <a:bodyPr>
+            <a:normAutofit/>
+          </a:bodyPr>
+          <a:lstStyle/>
+          <a:p>
+            <a:r>
+              <a:rPr lang="en-US" sz="4000" dirty="0">
                 <a:latin typeface="Arial" panose="020B0604020202020204" pitchFamily="34" charset="0"/>
                 <a:cs typeface="Arial" panose="020B0604020202020204" pitchFamily="34" charset="0"/>
               </a:rPr>
-              <a:t>Classes from which to start the alignment </a:t>
-            </a:r>
-            <a:endParaRPr lang="it-IT" dirty="0">
+              <a:t>Alignment Methodology (</a:t>
+            </a:r>
+            <a:r>
+              <a:rPr lang="en-US" sz="4000" dirty="0">
+                <a:solidFill>
+                  <a:srgbClr val="C00000"/>
+                </a:solidFill>
+                <a:latin typeface="Arial" panose="020B0604020202020204" pitchFamily="34" charset="0"/>
+                <a:cs typeface="Arial" panose="020B0604020202020204" pitchFamily="34" charset="0"/>
+              </a:rPr>
+              <a:t>work in progress</a:t>
+            </a:r>
+            <a:r>
+              <a:rPr lang="en-US" sz="4000" dirty="0">
+                <a:latin typeface="Arial" panose="020B0604020202020204" pitchFamily="34" charset="0"/>
+                <a:cs typeface="Arial" panose="020B0604020202020204" pitchFamily="34" charset="0"/>
+              </a:rPr>
+              <a:t>) </a:t>
+            </a:r>
+            <a:endParaRPr lang="it-IT" sz="4000" dirty="0">
               <a:latin typeface="Arial" panose="020B0604020202020204" pitchFamily="34" charset="0"/>
               <a:cs typeface="Arial" panose="020B0604020202020204" pitchFamily="34" charset="0"/>
             </a:endParaRPr>
@@ -4630,10 +5406,10 @@
       </p:sp>
       <p:sp>
         <p:nvSpPr>
-          <p:cNvPr id="3" name="Content Placeholder 2">
-            <a:extLst>
-              <a:ext uri="{FF2B5EF4-FFF2-40B4-BE49-F238E27FC236}">
-                <a16:creationId xmlns:a16="http://schemas.microsoft.com/office/drawing/2014/main" id="{EC12D414-A916-4DD7-4F2E-D899412985D3}"/>
+          <p:cNvPr id="9" name="Content Placeholder 2">
+            <a:extLst>
+              <a:ext uri="{FF2B5EF4-FFF2-40B4-BE49-F238E27FC236}">
+                <a16:creationId xmlns:a16="http://schemas.microsoft.com/office/drawing/2014/main" id="{D8C5AD31-3E49-4E58-55FA-012DF5A6C889}"/>
               </a:ext>
             </a:extLst>
           </p:cNvPr>
@@ -4644,72 +5420,237 @@
             <p:ph idx="1"/>
           </p:nvPr>
         </p:nvSpPr>
-        <p:spPr/>
-        <p:txBody>
-          <a:bodyPr/>
-          <a:lstStyle/>
-          <a:p>
-            <a:r>
-              <a:rPr lang="en-US" dirty="0">
-                <a:latin typeface="Calibri" panose="020F0502020204030204" pitchFamily="34" charset="0"/>
-                <a:ea typeface="Calibri" panose="020F0502020204030204" pitchFamily="34" charset="0"/>
-                <a:cs typeface="Calibri" panose="020F0502020204030204" pitchFamily="34" charset="0"/>
-              </a:rPr>
-              <a:t>Complex system.</a:t>
-            </a:r>
-          </a:p>
-          <a:p>
-            <a:r>
-              <a:rPr lang="en-US" dirty="0">
-                <a:latin typeface="Calibri" panose="020F0502020204030204" pitchFamily="34" charset="0"/>
-                <a:ea typeface="Calibri" panose="020F0502020204030204" pitchFamily="34" charset="0"/>
-                <a:cs typeface="Calibri" panose="020F0502020204030204" pitchFamily="34" charset="0"/>
-              </a:rPr>
-              <a:t>Complex system component.</a:t>
-            </a:r>
-          </a:p>
-          <a:p>
-            <a:r>
-              <a:rPr lang="en-US" dirty="0">
-                <a:latin typeface="Calibri" panose="020F0502020204030204" pitchFamily="34" charset="0"/>
-                <a:ea typeface="Calibri" panose="020F0502020204030204" pitchFamily="34" charset="0"/>
-                <a:cs typeface="Calibri" panose="020F0502020204030204" pitchFamily="34" charset="0"/>
-              </a:rPr>
-              <a:t>Interaction among complex system components.</a:t>
-            </a:r>
-          </a:p>
-          <a:p>
-            <a:r>
-              <a:rPr lang="en-US" dirty="0">
-                <a:latin typeface="Calibri" panose="020F0502020204030204" pitchFamily="34" charset="0"/>
-                <a:ea typeface="Calibri" panose="020F0502020204030204" pitchFamily="34" charset="0"/>
-                <a:cs typeface="Calibri" panose="020F0502020204030204" pitchFamily="34" charset="0"/>
-              </a:rPr>
-              <a:t>Stakeholder.</a:t>
-            </a:r>
-          </a:p>
-          <a:p>
-            <a:r>
-              <a:rPr lang="en-US" dirty="0">
-                <a:latin typeface="Calibri" panose="020F0502020204030204" pitchFamily="34" charset="0"/>
-                <a:ea typeface="Calibri" panose="020F0502020204030204" pitchFamily="34" charset="0"/>
-                <a:cs typeface="Calibri" panose="020F0502020204030204" pitchFamily="34" charset="0"/>
-              </a:rPr>
-              <a:t>Stakeholder role. </a:t>
-            </a:r>
-          </a:p>
-          <a:p>
-            <a:r>
-              <a:rPr lang="en-US" dirty="0">
-                <a:latin typeface="Calibri" panose="020F0502020204030204" pitchFamily="34" charset="0"/>
-                <a:ea typeface="Calibri" panose="020F0502020204030204" pitchFamily="34" charset="0"/>
-                <a:cs typeface="Calibri" panose="020F0502020204030204" pitchFamily="34" charset="0"/>
-              </a:rPr>
-              <a:t>Perspective.</a:t>
-            </a:r>
-          </a:p>
-          <a:p>
-            <a:endParaRPr lang="en-US" dirty="0">
+        <p:spPr>
+          <a:xfrm>
+            <a:off x="838200" y="1825625"/>
+            <a:ext cx="10515600" cy="4351338"/>
+          </a:xfrm>
+        </p:spPr>
+        <p:txBody>
+          <a:bodyPr>
+            <a:normAutofit/>
+          </a:bodyPr>
+          <a:lstStyle/>
+          <a:p>
+            <a:pPr marL="0" indent="0">
+              <a:lnSpc>
+                <a:spcPct val="107000"/>
+              </a:lnSpc>
+              <a:spcAft>
+                <a:spcPts val="800"/>
+              </a:spcAft>
+              <a:buNone/>
+              <a:tabLst>
+                <a:tab pos="457200" algn="l"/>
+              </a:tabLst>
+            </a:pPr>
+            <a:r>
+              <a:rPr lang="en-US" sz="2400" b="1" kern="100" dirty="0">
+                <a:effectLst/>
+                <a:latin typeface="Calibri" panose="020F0502020204030204" pitchFamily="34" charset="0"/>
+                <a:ea typeface="Aptos" panose="020B0004020202020204" pitchFamily="34" charset="0"/>
+                <a:cs typeface="Times New Roman" panose="02020603050405020304" pitchFamily="18" charset="0"/>
+              </a:rPr>
+              <a:t>Hierarchization</a:t>
+            </a:r>
+          </a:p>
+          <a:p>
+            <a:pPr marL="0" indent="0">
+              <a:lnSpc>
+                <a:spcPct val="107000"/>
+              </a:lnSpc>
+              <a:spcAft>
+                <a:spcPts val="800"/>
+              </a:spcAft>
+              <a:buNone/>
+              <a:tabLst>
+                <a:tab pos="457200" algn="l"/>
+              </a:tabLst>
+            </a:pPr>
+            <a:r>
+              <a:rPr lang="en-US" sz="1800" kern="100" dirty="0">
+                <a:effectLst/>
+                <a:latin typeface="Calibri" panose="020F0502020204030204" pitchFamily="34" charset="0"/>
+                <a:ea typeface="Aptos" panose="020B0004020202020204" pitchFamily="34" charset="0"/>
+                <a:cs typeface="Times New Roman" panose="02020603050405020304" pitchFamily="18" charset="0"/>
+              </a:rPr>
+              <a:t>Example: </a:t>
+            </a:r>
+            <a:r>
+              <a:rPr lang="en-US" sz="1800" u="sng" kern="100" dirty="0">
+                <a:solidFill>
+                  <a:srgbClr val="467886"/>
+                </a:solidFill>
+                <a:effectLst/>
+                <a:latin typeface="Calibri" panose="020F0502020204030204" pitchFamily="34" charset="0"/>
+                <a:ea typeface="Aptos" panose="020B0004020202020204" pitchFamily="34" charset="0"/>
+                <a:cs typeface="Times New Roman" panose="02020603050405020304" pitchFamily="18" charset="0"/>
+                <a:hlinkClick r:id="rId2"/>
+              </a:rPr>
+              <a:t>SCO “complex system” class</a:t>
+            </a:r>
+            <a:r>
+              <a:rPr lang="en-US" sz="1800" kern="100" dirty="0">
+                <a:effectLst/>
+                <a:latin typeface="Calibri" panose="020F0502020204030204" pitchFamily="34" charset="0"/>
+                <a:ea typeface="Aptos" panose="020B0004020202020204" pitchFamily="34" charset="0"/>
+                <a:cs typeface="Times New Roman" panose="02020603050405020304" pitchFamily="18" charset="0"/>
+              </a:rPr>
+              <a:t>.</a:t>
+            </a:r>
+            <a:endParaRPr lang="it-IT" sz="1800" kern="100" dirty="0">
+              <a:effectLst/>
+              <a:latin typeface="Aptos" panose="020B0004020202020204" pitchFamily="34" charset="0"/>
+              <a:ea typeface="Aptos" panose="020B0004020202020204" pitchFamily="34" charset="0"/>
+              <a:cs typeface="Times New Roman" panose="02020603050405020304" pitchFamily="18" charset="0"/>
+            </a:endParaRPr>
+          </a:p>
+          <a:p>
+            <a:pPr marL="0" lvl="0" indent="0">
+              <a:lnSpc>
+                <a:spcPct val="107000"/>
+              </a:lnSpc>
+              <a:spcAft>
+                <a:spcPts val="800"/>
+              </a:spcAft>
+              <a:buNone/>
+              <a:tabLst>
+                <a:tab pos="457200" algn="l"/>
+              </a:tabLst>
+            </a:pPr>
+            <a:r>
+              <a:rPr lang="en-US" sz="1800" kern="100" dirty="0">
+                <a:effectLst/>
+                <a:latin typeface="Calibri" panose="020F0502020204030204" pitchFamily="34" charset="0"/>
+                <a:ea typeface="Aptos" panose="020B0004020202020204" pitchFamily="34" charset="0"/>
+                <a:cs typeface="Times New Roman" panose="02020603050405020304" pitchFamily="18" charset="0"/>
+              </a:rPr>
+              <a:t>1) Background assessment </a:t>
+            </a:r>
+            <a:endParaRPr lang="it-IT" sz="1800" kern="100" dirty="0">
+              <a:effectLst/>
+              <a:latin typeface="Aptos" panose="020B0004020202020204" pitchFamily="34" charset="0"/>
+              <a:ea typeface="Aptos" panose="020B0004020202020204" pitchFamily="34" charset="0"/>
+              <a:cs typeface="Times New Roman" panose="02020603050405020304" pitchFamily="18" charset="0"/>
+            </a:endParaRPr>
+          </a:p>
+          <a:p>
+            <a:pPr marL="342900" lvl="0" indent="-342900">
+              <a:lnSpc>
+                <a:spcPct val="107000"/>
+              </a:lnSpc>
+              <a:spcAft>
+                <a:spcPts val="800"/>
+              </a:spcAft>
+              <a:buFont typeface="Arial" panose="020B0604020202020204" pitchFamily="34" charset="0"/>
+              <a:buChar char="•"/>
+              <a:tabLst>
+                <a:tab pos="457200" algn="l"/>
+              </a:tabLst>
+            </a:pPr>
+            <a:r>
+              <a:rPr lang="en-US" sz="1800" kern="100" dirty="0">
+                <a:effectLst/>
+                <a:latin typeface="Calibri" panose="020F0502020204030204" pitchFamily="34" charset="0"/>
+                <a:ea typeface="Aptos" panose="020B0004020202020204" pitchFamily="34" charset="0"/>
+                <a:cs typeface="Times New Roman" panose="02020603050405020304" pitchFamily="18" charset="0"/>
+              </a:rPr>
+              <a:t>Evaluating the position of </a:t>
+            </a:r>
+            <a:r>
+              <a:rPr lang="en-US" sz="1800" u="sng" kern="100" dirty="0">
+                <a:solidFill>
+                  <a:srgbClr val="467886"/>
+                </a:solidFill>
+                <a:effectLst/>
+                <a:latin typeface="Calibri" panose="020F0502020204030204" pitchFamily="34" charset="0"/>
+                <a:ea typeface="Aptos" panose="020B0004020202020204" pitchFamily="34" charset="0"/>
+                <a:cs typeface="Times New Roman" panose="02020603050405020304" pitchFamily="18" charset="0"/>
+                <a:hlinkClick r:id="rId2"/>
+              </a:rPr>
+              <a:t>SCO “complex system” class</a:t>
+            </a:r>
+            <a:r>
+              <a:rPr lang="en-US" sz="1800" kern="100" dirty="0">
+                <a:effectLst/>
+                <a:latin typeface="Calibri" panose="020F0502020204030204" pitchFamily="34" charset="0"/>
+                <a:ea typeface="Aptos" panose="020B0004020202020204" pitchFamily="34" charset="0"/>
+                <a:cs typeface="Times New Roman" panose="02020603050405020304" pitchFamily="18" charset="0"/>
+              </a:rPr>
+              <a:t> in the BFO hierarchy.</a:t>
+            </a:r>
+            <a:endParaRPr lang="it-IT" sz="1800" kern="100" dirty="0">
+              <a:effectLst/>
+              <a:latin typeface="Aptos" panose="020B0004020202020204" pitchFamily="34" charset="0"/>
+              <a:ea typeface="Aptos" panose="020B0004020202020204" pitchFamily="34" charset="0"/>
+              <a:cs typeface="Times New Roman" panose="02020603050405020304" pitchFamily="18" charset="0"/>
+            </a:endParaRPr>
+          </a:p>
+          <a:p>
+            <a:pPr marL="457200">
+              <a:lnSpc>
+                <a:spcPct val="107000"/>
+              </a:lnSpc>
+              <a:spcAft>
+                <a:spcPts val="800"/>
+              </a:spcAft>
+            </a:pPr>
+            <a:r>
+              <a:rPr lang="en-US" sz="1800" kern="100" dirty="0">
+                <a:effectLst/>
+                <a:latin typeface="Calibri" panose="020F0502020204030204" pitchFamily="34" charset="0"/>
+                <a:ea typeface="Aptos" panose="020B0004020202020204" pitchFamily="34" charset="0"/>
+                <a:cs typeface="Times New Roman" panose="02020603050405020304" pitchFamily="18" charset="0"/>
+              </a:rPr>
+              <a:t>(to use the materials documented in the “references” slide as a reference point.)</a:t>
+            </a:r>
+            <a:endParaRPr lang="it-IT" sz="1800" kern="100" dirty="0">
+              <a:effectLst/>
+              <a:latin typeface="Aptos" panose="020B0004020202020204" pitchFamily="34" charset="0"/>
+              <a:ea typeface="Aptos" panose="020B0004020202020204" pitchFamily="34" charset="0"/>
+              <a:cs typeface="Times New Roman" panose="02020603050405020304" pitchFamily="18" charset="0"/>
+            </a:endParaRPr>
+          </a:p>
+          <a:p>
+            <a:pPr marL="0" indent="0">
+              <a:lnSpc>
+                <a:spcPct val="107000"/>
+              </a:lnSpc>
+              <a:spcAft>
+                <a:spcPts val="800"/>
+              </a:spcAft>
+              <a:buNone/>
+            </a:pPr>
+            <a:r>
+              <a:rPr lang="en-US" sz="1800" i="1" kern="100" dirty="0">
+                <a:solidFill>
+                  <a:srgbClr val="C00000"/>
+                </a:solidFill>
+                <a:effectLst/>
+                <a:latin typeface="Calibri" panose="020F0502020204030204" pitchFamily="34" charset="0"/>
+                <a:ea typeface="Aptos" panose="020B0004020202020204" pitchFamily="34" charset="0"/>
+                <a:cs typeface="Times New Roman" panose="02020603050405020304" pitchFamily="18" charset="0"/>
+              </a:rPr>
+              <a:t>Subclass of the system class (subclass of “material entity” BFO class).</a:t>
+            </a:r>
+            <a:endParaRPr lang="it-IT" sz="1800" kern="100" dirty="0">
+              <a:effectLst/>
+              <a:latin typeface="Aptos" panose="020B0004020202020204" pitchFamily="34" charset="0"/>
+              <a:ea typeface="Aptos" panose="020B0004020202020204" pitchFamily="34" charset="0"/>
+              <a:cs typeface="Times New Roman" panose="02020603050405020304" pitchFamily="18" charset="0"/>
+            </a:endParaRPr>
+          </a:p>
+          <a:p>
+            <a:pPr marL="0" indent="0">
+              <a:lnSpc>
+                <a:spcPct val="107000"/>
+              </a:lnSpc>
+              <a:spcAft>
+                <a:spcPts val="800"/>
+              </a:spcAft>
+              <a:buNone/>
+            </a:pPr>
+            <a:endParaRPr lang="en-US" sz="2400" dirty="0">
               <a:latin typeface="Calibri" panose="020F0502020204030204" pitchFamily="34" charset="0"/>
               <a:ea typeface="Calibri" panose="020F0502020204030204" pitchFamily="34" charset="0"/>
               <a:cs typeface="Calibri" panose="020F0502020204030204" pitchFamily="34" charset="0"/>
@@ -4717,54 +5658,10 @@
           </a:p>
         </p:txBody>
       </p:sp>
-      <p:sp>
-        <p:nvSpPr>
-          <p:cNvPr id="4" name="TextBox 3">
-            <a:extLst>
-              <a:ext uri="{FF2B5EF4-FFF2-40B4-BE49-F238E27FC236}">
-                <a16:creationId xmlns:a16="http://schemas.microsoft.com/office/drawing/2014/main" id="{F047E27D-9CEE-596E-F8B3-1C062B634684}"/>
-              </a:ext>
-            </a:extLst>
-          </p:cNvPr>
-          <p:cNvSpPr txBox="1"/>
-          <p:nvPr/>
-        </p:nvSpPr>
-        <p:spPr>
-          <a:xfrm>
-            <a:off x="838200" y="5702709"/>
-            <a:ext cx="6764594" cy="369332"/>
-          </a:xfrm>
-          <a:prstGeom prst="rect">
-            <a:avLst/>
-          </a:prstGeom>
-          <a:noFill/>
-        </p:spPr>
-        <p:txBody>
-          <a:bodyPr wrap="square" rtlCol="0">
-            <a:spAutoFit/>
-          </a:bodyPr>
-          <a:lstStyle/>
-          <a:p>
-            <a:r>
-              <a:rPr lang="en-US" dirty="0">
-                <a:solidFill>
-                  <a:srgbClr val="C00000"/>
-                </a:solidFill>
-              </a:rPr>
-              <a:t>These are core SCO classes with regard to sustainability. </a:t>
-            </a:r>
-            <a:endParaRPr lang="it-IT" dirty="0">
-              <a:solidFill>
-                <a:srgbClr val="C00000"/>
-              </a:solidFill>
-            </a:endParaRPr>
-          </a:p>
-        </p:txBody>
-      </p:sp>
     </p:spTree>
     <p:extLst>
       <p:ext uri="{BB962C8B-B14F-4D97-AF65-F5344CB8AC3E}">
-        <p14:creationId xmlns:p14="http://schemas.microsoft.com/office/powerpoint/2010/main" val="456314186"/>
+        <p14:creationId xmlns:p14="http://schemas.microsoft.com/office/powerpoint/2010/main" val="3066331033"/>
       </p:ext>
     </p:extLst>
   </p:cSld>
@@ -4779,13 +5676,7 @@
   <p:cSld>
     <p:spTree>
       <p:nvGrpSpPr>
-        <p:cNvPr id="1" name="">
-          <a:extLst>
-            <a:ext uri="{FF2B5EF4-FFF2-40B4-BE49-F238E27FC236}">
-              <a16:creationId xmlns:a16="http://schemas.microsoft.com/office/drawing/2014/main" id="{540F39BC-4001-EC40-3789-A8240B3FC51D}"/>
-            </a:ext>
-          </a:extLst>
-        </p:cNvPr>
+        <p:cNvPr id="1" name=""/>
         <p:cNvGrpSpPr/>
         <p:nvPr/>
       </p:nvGrpSpPr>
@@ -4802,7 +5693,7 @@
           <p:cNvPr id="2" name="Title 1">
             <a:extLst>
               <a:ext uri="{FF2B5EF4-FFF2-40B4-BE49-F238E27FC236}">
-                <a16:creationId xmlns:a16="http://schemas.microsoft.com/office/drawing/2014/main" id="{42F46146-8CE5-7E2B-35A8-0A3AEC6002D7}"/>
+                <a16:creationId xmlns:a16="http://schemas.microsoft.com/office/drawing/2014/main" id="{9AD4B83D-AAD0-EE8E-8F33-43FEE4B002E6}"/>
               </a:ext>
             </a:extLst>
           </p:cNvPr>
@@ -4815,103 +5706,152 @@
         </p:nvSpPr>
         <p:spPr/>
         <p:txBody>
-          <a:bodyPr>
-            <a:normAutofit/>
-          </a:bodyPr>
-          <a:lstStyle/>
-          <a:p>
-            <a:r>
-              <a:rPr lang="en-US" sz="3600" dirty="0">
-                <a:latin typeface="Arial" panose="020B0604020202020204" pitchFamily="34" charset="0"/>
-                <a:cs typeface="Arial" panose="020B0604020202020204" pitchFamily="34" charset="0"/>
-              </a:rPr>
-              <a:t>Example: Complex System, Components, and Interactions.</a:t>
-            </a:r>
-            <a:endParaRPr lang="it-IT" sz="3600" dirty="0">
-              <a:latin typeface="Arial" panose="020B0604020202020204" pitchFamily="34" charset="0"/>
-              <a:cs typeface="Arial" panose="020B0604020202020204" pitchFamily="34" charset="0"/>
-            </a:endParaRPr>
-          </a:p>
-        </p:txBody>
-      </p:sp>
-      <p:sp>
-        <p:nvSpPr>
-          <p:cNvPr id="8" name="TextBox 7">
-            <a:extLst>
-              <a:ext uri="{FF2B5EF4-FFF2-40B4-BE49-F238E27FC236}">
-                <a16:creationId xmlns:a16="http://schemas.microsoft.com/office/drawing/2014/main" id="{E884D0D0-3BF8-5A02-F68B-FCC859904423}"/>
-              </a:ext>
-            </a:extLst>
-          </p:cNvPr>
-          <p:cNvSpPr txBox="1"/>
-          <p:nvPr/>
-        </p:nvSpPr>
-        <p:spPr>
-          <a:xfrm>
-            <a:off x="838200" y="6123543"/>
-            <a:ext cx="9224387" cy="369332"/>
-          </a:xfrm>
-          <a:prstGeom prst="rect">
-            <a:avLst/>
-          </a:prstGeom>
-          <a:noFill/>
-        </p:spPr>
-        <p:txBody>
-          <a:bodyPr wrap="square" rtlCol="0">
-            <a:spAutoFit/>
-          </a:bodyPr>
-          <a:lstStyle/>
-          <a:p>
-            <a:r>
-              <a:rPr lang="en-US" dirty="0">
-                <a:latin typeface="Calibri" panose="020F0502020204030204" pitchFamily="34" charset="0"/>
-                <a:ea typeface="Calibri" panose="020F0502020204030204" pitchFamily="34" charset="0"/>
-                <a:cs typeface="Calibri" panose="020F0502020204030204" pitchFamily="34" charset="0"/>
-              </a:rPr>
-              <a:t>The SCO representation that is BFO compliant.</a:t>
-            </a:r>
-            <a:endParaRPr lang="it-IT" dirty="0">
+          <a:bodyPr/>
+          <a:lstStyle/>
+          <a:p>
+            <a:endParaRPr lang="it-IT"/>
+          </a:p>
+        </p:txBody>
+      </p:sp>
+      <p:sp>
+        <p:nvSpPr>
+          <p:cNvPr id="3" name="Content Placeholder 2">
+            <a:extLst>
+              <a:ext uri="{FF2B5EF4-FFF2-40B4-BE49-F238E27FC236}">
+                <a16:creationId xmlns:a16="http://schemas.microsoft.com/office/drawing/2014/main" id="{B2E7435F-A932-914D-AED3-5D36C81182B2}"/>
+              </a:ext>
+            </a:extLst>
+          </p:cNvPr>
+          <p:cNvSpPr>
+            <a:spLocks noGrp="1"/>
+          </p:cNvSpPr>
+          <p:nvPr>
+            <p:ph idx="1"/>
+          </p:nvPr>
+        </p:nvSpPr>
+        <p:spPr/>
+        <p:txBody>
+          <a:bodyPr/>
+          <a:lstStyle/>
+          <a:p>
+            <a:pPr marL="0" lvl="0" indent="0">
+              <a:lnSpc>
+                <a:spcPct val="107000"/>
+              </a:lnSpc>
+              <a:spcAft>
+                <a:spcPts val="800"/>
+              </a:spcAft>
+              <a:buNone/>
+            </a:pPr>
+            <a:r>
+              <a:rPr lang="en-US" sz="1700" kern="100" dirty="0">
+                <a:effectLst/>
+                <a:latin typeface="Calibri" panose="020F0502020204030204" pitchFamily="34" charset="0"/>
+                <a:ea typeface="Calibri" panose="020F0502020204030204" pitchFamily="34" charset="0"/>
+                <a:cs typeface="Calibri" panose="020F0502020204030204" pitchFamily="34" charset="0"/>
+              </a:rPr>
+              <a:t>2) Exploration of correspondences </a:t>
+            </a:r>
+            <a:endParaRPr lang="it-IT" sz="1700" kern="100" dirty="0">
+              <a:effectLst/>
               <a:latin typeface="Calibri" panose="020F0502020204030204" pitchFamily="34" charset="0"/>
               <a:ea typeface="Calibri" panose="020F0502020204030204" pitchFamily="34" charset="0"/>
               <a:cs typeface="Calibri" panose="020F0502020204030204" pitchFamily="34" charset="0"/>
             </a:endParaRPr>
           </a:p>
-        </p:txBody>
-      </p:sp>
-      <p:pic>
-        <p:nvPicPr>
-          <p:cNvPr id="6" name="Picture 5">
-            <a:extLst>
-              <a:ext uri="{FF2B5EF4-FFF2-40B4-BE49-F238E27FC236}">
-                <a16:creationId xmlns:a16="http://schemas.microsoft.com/office/drawing/2014/main" id="{E5C734C1-45B5-76BD-1D99-67E17F9D3F4A}"/>
-              </a:ext>
-            </a:extLst>
-          </p:cNvPr>
-          <p:cNvPicPr>
-            <a:picLocks noChangeAspect="1"/>
-          </p:cNvPicPr>
-          <p:nvPr/>
-        </p:nvPicPr>
-        <p:blipFill>
-          <a:blip r:embed="rId2"/>
-          <a:stretch>
-            <a:fillRect/>
-          </a:stretch>
-        </p:blipFill>
-        <p:spPr>
-          <a:xfrm>
-            <a:off x="451888" y="1790558"/>
-            <a:ext cx="11469094" cy="3276884"/>
-          </a:xfrm>
-          <a:prstGeom prst="rect">
-            <a:avLst/>
-          </a:prstGeom>
-        </p:spPr>
-      </p:pic>
+          <a:p>
+            <a:pPr marL="342900" lvl="0" indent="-342900">
+              <a:lnSpc>
+                <a:spcPct val="107000"/>
+              </a:lnSpc>
+              <a:spcAft>
+                <a:spcPts val="800"/>
+              </a:spcAft>
+              <a:buFont typeface="Arial" panose="020B0604020202020204" pitchFamily="34" charset="0"/>
+              <a:buChar char="•"/>
+              <a:tabLst>
+                <a:tab pos="457200" algn="l"/>
+              </a:tabLst>
+            </a:pPr>
+            <a:r>
+              <a:rPr lang="en-US" sz="1700" kern="100" dirty="0">
+                <a:effectLst/>
+                <a:latin typeface="Calibri" panose="020F0502020204030204" pitchFamily="34" charset="0"/>
+                <a:ea typeface="Calibri" panose="020F0502020204030204" pitchFamily="34" charset="0"/>
+                <a:cs typeface="Calibri" panose="020F0502020204030204" pitchFamily="34" charset="0"/>
+              </a:rPr>
+              <a:t>Identification of the rough corresponding class position into the gUFO “individual” class hierarchy.</a:t>
+            </a:r>
+            <a:endParaRPr lang="it-IT" sz="1700" kern="100" dirty="0">
+              <a:effectLst/>
+              <a:latin typeface="Calibri" panose="020F0502020204030204" pitchFamily="34" charset="0"/>
+              <a:ea typeface="Calibri" panose="020F0502020204030204" pitchFamily="34" charset="0"/>
+              <a:cs typeface="Calibri" panose="020F0502020204030204" pitchFamily="34" charset="0"/>
+            </a:endParaRPr>
+          </a:p>
+          <a:p>
+            <a:pPr marL="457200">
+              <a:lnSpc>
+                <a:spcPct val="107000"/>
+              </a:lnSpc>
+              <a:spcAft>
+                <a:spcPts val="800"/>
+              </a:spcAft>
+            </a:pPr>
+            <a:r>
+              <a:rPr lang="en-US" sz="1700" kern="100" dirty="0">
+                <a:effectLst/>
+                <a:latin typeface="Calibri" panose="020F0502020204030204" pitchFamily="34" charset="0"/>
+                <a:ea typeface="Calibri" panose="020F0502020204030204" pitchFamily="34" charset="0"/>
+                <a:cs typeface="Calibri" panose="020F0502020204030204" pitchFamily="34" charset="0"/>
+              </a:rPr>
+              <a:t>(to use the materials documented in the “references” slide as a reference point.)</a:t>
+            </a:r>
+            <a:endParaRPr lang="it-IT" sz="1700" kern="100" dirty="0">
+              <a:effectLst/>
+              <a:latin typeface="Calibri" panose="020F0502020204030204" pitchFamily="34" charset="0"/>
+              <a:ea typeface="Calibri" panose="020F0502020204030204" pitchFamily="34" charset="0"/>
+              <a:cs typeface="Calibri" panose="020F0502020204030204" pitchFamily="34" charset="0"/>
+            </a:endParaRPr>
+          </a:p>
+          <a:p>
+            <a:pPr marL="0" indent="0">
+              <a:lnSpc>
+                <a:spcPct val="107000"/>
+              </a:lnSpc>
+              <a:spcAft>
+                <a:spcPts val="800"/>
+              </a:spcAft>
+              <a:buNone/>
+            </a:pPr>
+            <a:r>
+              <a:rPr lang="en-US" sz="1700" i="1" kern="100" dirty="0">
+                <a:solidFill>
+                  <a:srgbClr val="C00000"/>
+                </a:solidFill>
+                <a:effectLst/>
+                <a:latin typeface="Calibri" panose="020F0502020204030204" pitchFamily="34" charset="0"/>
+                <a:ea typeface="Calibri" panose="020F0502020204030204" pitchFamily="34" charset="0"/>
+                <a:cs typeface="Calibri" panose="020F0502020204030204" pitchFamily="34" charset="0"/>
+              </a:rPr>
+              <a:t>To position under the “endurant” -&gt; “object”   branch of the “individual” gUFO class hierarchy. </a:t>
+            </a:r>
+            <a:endParaRPr lang="it-IT" sz="1700" kern="100" dirty="0">
+              <a:effectLst/>
+              <a:latin typeface="Calibri" panose="020F0502020204030204" pitchFamily="34" charset="0"/>
+              <a:ea typeface="Calibri" panose="020F0502020204030204" pitchFamily="34" charset="0"/>
+              <a:cs typeface="Calibri" panose="020F0502020204030204" pitchFamily="34" charset="0"/>
+            </a:endParaRPr>
+          </a:p>
+          <a:p>
+            <a:endParaRPr lang="it-IT" dirty="0"/>
+          </a:p>
+        </p:txBody>
+      </p:sp>
     </p:spTree>
     <p:extLst>
       <p:ext uri="{BB962C8B-B14F-4D97-AF65-F5344CB8AC3E}">
-        <p14:creationId xmlns:p14="http://schemas.microsoft.com/office/powerpoint/2010/main" val="3743612181"/>
+        <p14:creationId xmlns:p14="http://schemas.microsoft.com/office/powerpoint/2010/main" val="1984592279"/>
       </p:ext>
     </p:extLst>
   </p:cSld>
@@ -4943,7 +5883,7 @@
           <p:cNvPr id="2" name="Title 1">
             <a:extLst>
               <a:ext uri="{FF2B5EF4-FFF2-40B4-BE49-F238E27FC236}">
-                <a16:creationId xmlns:a16="http://schemas.microsoft.com/office/drawing/2014/main" id="{74599347-6F32-A7D6-9DC9-C494086F5C21}"/>
+                <a16:creationId xmlns:a16="http://schemas.microsoft.com/office/drawing/2014/main" id="{6679DE78-74CA-33A1-8B02-E6A7C8C57A9B}"/>
               </a:ext>
             </a:extLst>
           </p:cNvPr>
@@ -4968,7 +5908,7 @@
           <p:cNvPr id="3" name="Content Placeholder 2">
             <a:extLst>
               <a:ext uri="{FF2B5EF4-FFF2-40B4-BE49-F238E27FC236}">
-                <a16:creationId xmlns:a16="http://schemas.microsoft.com/office/drawing/2014/main" id="{43E1F1DD-6835-E9CE-438E-5D8BBB15143F}"/>
+                <a16:creationId xmlns:a16="http://schemas.microsoft.com/office/drawing/2014/main" id="{3A565828-EBC5-3875-CDB3-986A550FEA0D}"/>
               </a:ext>
             </a:extLst>
           </p:cNvPr>
@@ -4981,8 +5921,207 @@
         </p:nvSpPr>
         <p:spPr/>
         <p:txBody>
-          <a:bodyPr/>
-          <a:lstStyle/>
+          <a:bodyPr>
+            <a:normAutofit/>
+          </a:bodyPr>
+          <a:lstStyle/>
+          <a:p>
+            <a:pPr marL="0" lvl="0" indent="0">
+              <a:lnSpc>
+                <a:spcPct val="107000"/>
+              </a:lnSpc>
+              <a:spcAft>
+                <a:spcPts val="800"/>
+              </a:spcAft>
+              <a:buNone/>
+            </a:pPr>
+            <a:r>
+              <a:rPr lang="en-US" sz="1700" kern="100" dirty="0">
+                <a:effectLst/>
+                <a:latin typeface="Calibri" panose="020F0502020204030204" pitchFamily="34" charset="0"/>
+                <a:ea typeface="Calibri" panose="020F0502020204030204" pitchFamily="34" charset="0"/>
+                <a:cs typeface="Calibri" panose="020F0502020204030204" pitchFamily="34" charset="0"/>
+              </a:rPr>
+              <a:t>3) Construction of SCO-gUFO “individual” class hierarchy </a:t>
+            </a:r>
+            <a:endParaRPr lang="it-IT" sz="1700" kern="100" dirty="0">
+              <a:effectLst/>
+              <a:latin typeface="Calibri" panose="020F0502020204030204" pitchFamily="34" charset="0"/>
+              <a:ea typeface="Calibri" panose="020F0502020204030204" pitchFamily="34" charset="0"/>
+              <a:cs typeface="Calibri" panose="020F0502020204030204" pitchFamily="34" charset="0"/>
+            </a:endParaRPr>
+          </a:p>
+          <a:p>
+            <a:pPr marL="342900" lvl="0" indent="-342900">
+              <a:lnSpc>
+                <a:spcPct val="107000"/>
+              </a:lnSpc>
+              <a:spcAft>
+                <a:spcPts val="800"/>
+              </a:spcAft>
+              <a:buFont typeface="Arial" panose="020B0604020202020204" pitchFamily="34" charset="0"/>
+              <a:buChar char="•"/>
+              <a:tabLst>
+                <a:tab pos="457200" algn="l"/>
+              </a:tabLst>
+            </a:pPr>
+            <a:r>
+              <a:rPr lang="en-US" sz="1700" kern="100" dirty="0">
+                <a:effectLst/>
+                <a:latin typeface="Calibri" panose="020F0502020204030204" pitchFamily="34" charset="0"/>
+                <a:ea typeface="Calibri" panose="020F0502020204030204" pitchFamily="34" charset="0"/>
+                <a:cs typeface="Calibri" panose="020F0502020204030204" pitchFamily="34" charset="0"/>
+              </a:rPr>
+              <a:t>Identification of adequate upper-level class(es) into the gUFO “individual” class hierarchy.</a:t>
+            </a:r>
+            <a:endParaRPr lang="it-IT" sz="1700" kern="100" dirty="0">
+              <a:effectLst/>
+              <a:latin typeface="Calibri" panose="020F0502020204030204" pitchFamily="34" charset="0"/>
+              <a:ea typeface="Calibri" panose="020F0502020204030204" pitchFamily="34" charset="0"/>
+              <a:cs typeface="Calibri" panose="020F0502020204030204" pitchFamily="34" charset="0"/>
+            </a:endParaRPr>
+          </a:p>
+          <a:p>
+            <a:pPr marL="457200">
+              <a:lnSpc>
+                <a:spcPct val="107000"/>
+              </a:lnSpc>
+              <a:spcAft>
+                <a:spcPts val="800"/>
+              </a:spcAft>
+            </a:pPr>
+            <a:r>
+              <a:rPr lang="en-US" sz="1700" kern="100" dirty="0">
+                <a:effectLst/>
+                <a:latin typeface="Calibri" panose="020F0502020204030204" pitchFamily="34" charset="0"/>
+                <a:ea typeface="Calibri" panose="020F0502020204030204" pitchFamily="34" charset="0"/>
+                <a:cs typeface="Calibri" panose="020F0502020204030204" pitchFamily="34" charset="0"/>
+              </a:rPr>
+              <a:t>(to use the materials documented in the “references” slide as a reference point.)</a:t>
+            </a:r>
+            <a:endParaRPr lang="it-IT" sz="1700" kern="100" dirty="0">
+              <a:effectLst/>
+              <a:latin typeface="Calibri" panose="020F0502020204030204" pitchFamily="34" charset="0"/>
+              <a:ea typeface="Calibri" panose="020F0502020204030204" pitchFamily="34" charset="0"/>
+              <a:cs typeface="Calibri" panose="020F0502020204030204" pitchFamily="34" charset="0"/>
+            </a:endParaRPr>
+          </a:p>
+          <a:p>
+            <a:pPr marL="228600">
+              <a:lnSpc>
+                <a:spcPct val="107000"/>
+              </a:lnSpc>
+              <a:spcAft>
+                <a:spcPts val="800"/>
+              </a:spcAft>
+            </a:pPr>
+            <a:r>
+              <a:rPr lang="en-US" sz="1700" i="1" kern="100" dirty="0">
+                <a:solidFill>
+                  <a:srgbClr val="C00000"/>
+                </a:solidFill>
+                <a:effectLst/>
+                <a:latin typeface="Calibri" panose="020F0502020204030204" pitchFamily="34" charset="0"/>
+                <a:ea typeface="Calibri" panose="020F0502020204030204" pitchFamily="34" charset="0"/>
+                <a:cs typeface="Calibri" panose="020F0502020204030204" pitchFamily="34" charset="0"/>
+              </a:rPr>
+              <a:t>Subclass of: “object” gUFO class.</a:t>
+            </a:r>
+            <a:endParaRPr lang="it-IT" sz="1700" kern="100" dirty="0">
+              <a:effectLst/>
+              <a:latin typeface="Calibri" panose="020F0502020204030204" pitchFamily="34" charset="0"/>
+              <a:ea typeface="Calibri" panose="020F0502020204030204" pitchFamily="34" charset="0"/>
+              <a:cs typeface="Calibri" panose="020F0502020204030204" pitchFamily="34" charset="0"/>
+            </a:endParaRPr>
+          </a:p>
+          <a:p>
+            <a:pPr marL="342900" lvl="0" indent="-342900">
+              <a:lnSpc>
+                <a:spcPct val="107000"/>
+              </a:lnSpc>
+              <a:spcAft>
+                <a:spcPts val="800"/>
+              </a:spcAft>
+              <a:buFont typeface="Arial" panose="020B0604020202020204" pitchFamily="34" charset="0"/>
+              <a:buChar char="•"/>
+              <a:tabLst>
+                <a:tab pos="457200" algn="l"/>
+              </a:tabLst>
+            </a:pPr>
+            <a:r>
+              <a:rPr lang="en-US" sz="1700" kern="100" dirty="0">
+                <a:effectLst/>
+                <a:latin typeface="Calibri" panose="020F0502020204030204" pitchFamily="34" charset="0"/>
+                <a:ea typeface="Calibri" panose="020F0502020204030204" pitchFamily="34" charset="0"/>
+                <a:cs typeface="Calibri" panose="020F0502020204030204" pitchFamily="34" charset="0"/>
+              </a:rPr>
+              <a:t>In Protégé: to add the </a:t>
+            </a:r>
+            <a:r>
+              <a:rPr lang="en-US" sz="1700" u="sng" kern="100" dirty="0">
+                <a:solidFill>
+                  <a:srgbClr val="467886"/>
+                </a:solidFill>
+                <a:effectLst/>
+                <a:latin typeface="Calibri" panose="020F0502020204030204" pitchFamily="34" charset="0"/>
+                <a:ea typeface="Calibri" panose="020F0502020204030204" pitchFamily="34" charset="0"/>
+                <a:cs typeface="Calibri" panose="020F0502020204030204" pitchFamily="34" charset="0"/>
+                <a:hlinkClick r:id="rId2"/>
+              </a:rPr>
+              <a:t>SCO “complex system” class</a:t>
+            </a:r>
+            <a:r>
+              <a:rPr lang="en-US" sz="1700" kern="100" dirty="0">
+                <a:effectLst/>
+                <a:latin typeface="Calibri" panose="020F0502020204030204" pitchFamily="34" charset="0"/>
+                <a:ea typeface="Calibri" panose="020F0502020204030204" pitchFamily="34" charset="0"/>
+                <a:cs typeface="Calibri" panose="020F0502020204030204" pitchFamily="34" charset="0"/>
+              </a:rPr>
+              <a:t> </a:t>
+            </a:r>
+            <a:r>
+              <a:rPr lang="en-US" sz="1700" i="1" kern="100" dirty="0" err="1">
+                <a:effectLst/>
+                <a:latin typeface="Calibri" panose="020F0502020204030204" pitchFamily="34" charset="0"/>
+                <a:ea typeface="Calibri" panose="020F0502020204030204" pitchFamily="34" charset="0"/>
+                <a:cs typeface="Calibri" panose="020F0502020204030204" pitchFamily="34" charset="0"/>
+              </a:rPr>
+              <a:t>is_a</a:t>
+            </a:r>
+            <a:r>
+              <a:rPr lang="en-US" sz="1700" kern="100" dirty="0">
+                <a:effectLst/>
+                <a:latin typeface="Calibri" panose="020F0502020204030204" pitchFamily="34" charset="0"/>
+                <a:ea typeface="Calibri" panose="020F0502020204030204" pitchFamily="34" charset="0"/>
+                <a:cs typeface="Calibri" panose="020F0502020204030204" pitchFamily="34" charset="0"/>
+              </a:rPr>
+              <a:t> (</a:t>
+            </a:r>
+            <a:r>
+              <a:rPr lang="en-US" sz="1700" i="1" kern="100" dirty="0" err="1">
+                <a:effectLst/>
+                <a:latin typeface="Calibri" panose="020F0502020204030204" pitchFamily="34" charset="0"/>
+                <a:ea typeface="Calibri" panose="020F0502020204030204" pitchFamily="34" charset="0"/>
+                <a:cs typeface="Calibri" panose="020F0502020204030204" pitchFamily="34" charset="0"/>
+              </a:rPr>
+              <a:t>subclassOf</a:t>
+            </a:r>
+            <a:r>
+              <a:rPr lang="en-US" sz="1700" kern="100" dirty="0">
+                <a:effectLst/>
+                <a:latin typeface="Calibri" panose="020F0502020204030204" pitchFamily="34" charset="0"/>
+                <a:ea typeface="Calibri" panose="020F0502020204030204" pitchFamily="34" charset="0"/>
+                <a:cs typeface="Calibri" panose="020F0502020204030204" pitchFamily="34" charset="0"/>
+              </a:rPr>
+              <a:t>) gUFO “object” class assertion.</a:t>
+            </a:r>
+            <a:endParaRPr lang="it-IT" sz="1700" kern="100" dirty="0">
+              <a:effectLst/>
+              <a:latin typeface="Calibri" panose="020F0502020204030204" pitchFamily="34" charset="0"/>
+              <a:ea typeface="Calibri" panose="020F0502020204030204" pitchFamily="34" charset="0"/>
+              <a:cs typeface="Calibri" panose="020F0502020204030204" pitchFamily="34" charset="0"/>
+            </a:endParaRPr>
+          </a:p>
           <a:p>
             <a:endParaRPr lang="it-IT" dirty="0"/>
           </a:p>
@@ -4991,7 +6130,7 @@
     </p:spTree>
     <p:extLst>
       <p:ext uri="{BB962C8B-B14F-4D97-AF65-F5344CB8AC3E}">
-        <p14:creationId xmlns:p14="http://schemas.microsoft.com/office/powerpoint/2010/main" val="936711700"/>
+        <p14:creationId xmlns:p14="http://schemas.microsoft.com/office/powerpoint/2010/main" val="2139718601"/>
       </p:ext>
     </p:extLst>
   </p:cSld>
@@ -5006,13 +6145,7 @@
   <p:cSld>
     <p:spTree>
       <p:nvGrpSpPr>
-        <p:cNvPr id="1" name="">
-          <a:extLst>
-            <a:ext uri="{FF2B5EF4-FFF2-40B4-BE49-F238E27FC236}">
-              <a16:creationId xmlns:a16="http://schemas.microsoft.com/office/drawing/2014/main" id="{56E886F1-CB7B-2D8F-1455-67B55D64B2FB}"/>
-            </a:ext>
-          </a:extLst>
-        </p:cNvPr>
+        <p:cNvPr id="1" name=""/>
         <p:cNvGrpSpPr/>
         <p:nvPr/>
       </p:nvGrpSpPr>
@@ -5029,7 +6162,7 @@
           <p:cNvPr id="2" name="Title 1">
             <a:extLst>
               <a:ext uri="{FF2B5EF4-FFF2-40B4-BE49-F238E27FC236}">
-                <a16:creationId xmlns:a16="http://schemas.microsoft.com/office/drawing/2014/main" id="{4CA52769-B2EA-5315-47B3-47BA7FB0BB6E}"/>
+                <a16:creationId xmlns:a16="http://schemas.microsoft.com/office/drawing/2014/main" id="{013A5C31-133F-FC85-FFB1-5D967236E21E}"/>
               </a:ext>
             </a:extLst>
           </p:cNvPr>
@@ -5042,52 +6175,318 @@
         </p:nvSpPr>
         <p:spPr/>
         <p:txBody>
+          <a:bodyPr/>
+          <a:lstStyle/>
+          <a:p>
+            <a:endParaRPr lang="it-IT"/>
+          </a:p>
+        </p:txBody>
+      </p:sp>
+      <p:sp>
+        <p:nvSpPr>
+          <p:cNvPr id="3" name="Content Placeholder 2">
+            <a:extLst>
+              <a:ext uri="{FF2B5EF4-FFF2-40B4-BE49-F238E27FC236}">
+                <a16:creationId xmlns:a16="http://schemas.microsoft.com/office/drawing/2014/main" id="{1F9F90B3-42F6-F880-24A9-FB94A851BBF1}"/>
+              </a:ext>
+            </a:extLst>
+          </p:cNvPr>
+          <p:cNvSpPr>
+            <a:spLocks noGrp="1"/>
+          </p:cNvSpPr>
+          <p:nvPr>
+            <p:ph idx="1"/>
+          </p:nvPr>
+        </p:nvSpPr>
+        <p:spPr/>
+        <p:txBody>
           <a:bodyPr>
-            <a:normAutofit/>
+            <a:normAutofit fontScale="85000" lnSpcReduction="20000"/>
           </a:bodyPr>
           <a:lstStyle/>
           <a:p>
-            <a:r>
-              <a:rPr lang="en-US" dirty="0">
-                <a:latin typeface="Arial" panose="020B0604020202020204" pitchFamily="34" charset="0"/>
-                <a:cs typeface="Arial" panose="020B0604020202020204" pitchFamily="34" charset="0"/>
-              </a:rPr>
-              <a:t>References </a:t>
-            </a:r>
-            <a:endParaRPr lang="it-IT" dirty="0">
-              <a:latin typeface="Arial" panose="020B0604020202020204" pitchFamily="34" charset="0"/>
-              <a:cs typeface="Arial" panose="020B0604020202020204" pitchFamily="34" charset="0"/>
+            <a:pPr marL="0" lvl="0" indent="0">
+              <a:lnSpc>
+                <a:spcPct val="107000"/>
+              </a:lnSpc>
+              <a:spcAft>
+                <a:spcPts val="800"/>
+              </a:spcAft>
+              <a:buNone/>
+            </a:pPr>
+            <a:r>
+              <a:rPr lang="en-US" sz="2000" kern="100" dirty="0">
+                <a:effectLst/>
+                <a:latin typeface="Calibri" panose="020F0502020204030204" pitchFamily="34" charset="0"/>
+                <a:ea typeface="Aptos" panose="020B0004020202020204" pitchFamily="34" charset="0"/>
+                <a:cs typeface="Times New Roman" panose="02020603050405020304" pitchFamily="18" charset="0"/>
+              </a:rPr>
+              <a:t>4)</a:t>
+            </a:r>
+            <a:r>
+              <a:rPr lang="en-US" sz="2800" kern="100" dirty="0">
+                <a:effectLst/>
+                <a:latin typeface="Calibri" panose="020F0502020204030204" pitchFamily="34" charset="0"/>
+                <a:ea typeface="Aptos" panose="020B0004020202020204" pitchFamily="34" charset="0"/>
+                <a:cs typeface="Times New Roman" panose="02020603050405020304" pitchFamily="18" charset="0"/>
+              </a:rPr>
+              <a:t> </a:t>
+            </a:r>
+            <a:r>
+              <a:rPr lang="en-US" sz="2200" kern="100" dirty="0">
+                <a:effectLst/>
+                <a:latin typeface="Calibri" panose="020F0502020204030204" pitchFamily="34" charset="0"/>
+                <a:ea typeface="Calibri" panose="020F0502020204030204" pitchFamily="34" charset="0"/>
+                <a:cs typeface="Calibri" panose="020F0502020204030204" pitchFamily="34" charset="0"/>
+              </a:rPr>
+              <a:t>Construction of SCO-gUFO “type” class hierarchy </a:t>
+            </a:r>
+            <a:endParaRPr lang="it-IT" sz="2200" kern="100" dirty="0">
+              <a:effectLst/>
+              <a:latin typeface="Calibri" panose="020F0502020204030204" pitchFamily="34" charset="0"/>
+              <a:ea typeface="Calibri" panose="020F0502020204030204" pitchFamily="34" charset="0"/>
+              <a:cs typeface="Calibri" panose="020F0502020204030204" pitchFamily="34" charset="0"/>
             </a:endParaRPr>
           </a:p>
-        </p:txBody>
-      </p:sp>
-      <p:sp>
-        <p:nvSpPr>
-          <p:cNvPr id="9" name="Content Placeholder 2">
-            <a:extLst>
-              <a:ext uri="{FF2B5EF4-FFF2-40B4-BE49-F238E27FC236}">
-                <a16:creationId xmlns:a16="http://schemas.microsoft.com/office/drawing/2014/main" id="{FD700632-7E70-F24B-4874-0356A04AA681}"/>
-              </a:ext>
-            </a:extLst>
-          </p:cNvPr>
-          <p:cNvSpPr>
-            <a:spLocks noGrp="1"/>
-          </p:cNvSpPr>
-          <p:nvPr>
-            <p:ph idx="1"/>
-          </p:nvPr>
-        </p:nvSpPr>
-        <p:spPr>
-          <a:xfrm>
-            <a:off x="838200" y="1825625"/>
-            <a:ext cx="10515600" cy="4351338"/>
-          </a:xfrm>
-        </p:spPr>
-        <p:txBody>
-          <a:bodyPr>
-            <a:normAutofit/>
-          </a:bodyPr>
-          <a:lstStyle/>
+          <a:p>
+            <a:pPr marL="342900" lvl="0" indent="-342900">
+              <a:lnSpc>
+                <a:spcPct val="107000"/>
+              </a:lnSpc>
+              <a:spcAft>
+                <a:spcPts val="800"/>
+              </a:spcAft>
+              <a:buFont typeface="Arial" panose="020B0604020202020204" pitchFamily="34" charset="0"/>
+              <a:buChar char="•"/>
+              <a:tabLst>
+                <a:tab pos="457200" algn="l"/>
+              </a:tabLst>
+            </a:pPr>
+            <a:r>
+              <a:rPr lang="en-US" sz="2200" kern="100" dirty="0">
+                <a:effectLst/>
+                <a:latin typeface="Calibri" panose="020F0502020204030204" pitchFamily="34" charset="0"/>
+                <a:ea typeface="Calibri" panose="020F0502020204030204" pitchFamily="34" charset="0"/>
+                <a:cs typeface="Calibri" panose="020F0502020204030204" pitchFamily="34" charset="0"/>
+              </a:rPr>
+              <a:t>Identification of the “type” class that the </a:t>
+            </a:r>
+            <a:r>
+              <a:rPr lang="en-US" sz="2200" u="sng" kern="100" dirty="0">
+                <a:solidFill>
+                  <a:srgbClr val="467886"/>
+                </a:solidFill>
+                <a:effectLst/>
+                <a:latin typeface="Calibri" panose="020F0502020204030204" pitchFamily="34" charset="0"/>
+                <a:ea typeface="Calibri" panose="020F0502020204030204" pitchFamily="34" charset="0"/>
+                <a:cs typeface="Calibri" panose="020F0502020204030204" pitchFamily="34" charset="0"/>
+                <a:hlinkClick r:id="rId2"/>
+              </a:rPr>
+              <a:t>SCO “complex system” class</a:t>
+            </a:r>
+            <a:r>
+              <a:rPr lang="en-US" sz="2200" kern="100" dirty="0">
+                <a:effectLst/>
+                <a:latin typeface="Calibri" panose="020F0502020204030204" pitchFamily="34" charset="0"/>
+                <a:ea typeface="Calibri" panose="020F0502020204030204" pitchFamily="34" charset="0"/>
+                <a:cs typeface="Calibri" panose="020F0502020204030204" pitchFamily="34" charset="0"/>
+              </a:rPr>
+              <a:t> instantiates into the gUFO “type” class hierarchy.</a:t>
+            </a:r>
+            <a:endParaRPr lang="it-IT" sz="2200" kern="100" dirty="0">
+              <a:effectLst/>
+              <a:latin typeface="Calibri" panose="020F0502020204030204" pitchFamily="34" charset="0"/>
+              <a:ea typeface="Calibri" panose="020F0502020204030204" pitchFamily="34" charset="0"/>
+              <a:cs typeface="Calibri" panose="020F0502020204030204" pitchFamily="34" charset="0"/>
+            </a:endParaRPr>
+          </a:p>
+          <a:p>
+            <a:pPr marL="457200">
+              <a:lnSpc>
+                <a:spcPct val="107000"/>
+              </a:lnSpc>
+              <a:spcAft>
+                <a:spcPts val="800"/>
+              </a:spcAft>
+            </a:pPr>
+            <a:r>
+              <a:rPr lang="en-US" sz="2200" kern="100" dirty="0">
+                <a:effectLst/>
+                <a:latin typeface="Calibri" panose="020F0502020204030204" pitchFamily="34" charset="0"/>
+                <a:ea typeface="Calibri" panose="020F0502020204030204" pitchFamily="34" charset="0"/>
+                <a:cs typeface="Calibri" panose="020F0502020204030204" pitchFamily="34" charset="0"/>
+              </a:rPr>
+              <a:t>(to use the materials documented in the “references” slide as a reference point.)</a:t>
+            </a:r>
+            <a:endParaRPr lang="it-IT" sz="2200" kern="100" dirty="0">
+              <a:effectLst/>
+              <a:latin typeface="Calibri" panose="020F0502020204030204" pitchFamily="34" charset="0"/>
+              <a:ea typeface="Calibri" panose="020F0502020204030204" pitchFamily="34" charset="0"/>
+              <a:cs typeface="Calibri" panose="020F0502020204030204" pitchFamily="34" charset="0"/>
+            </a:endParaRPr>
+          </a:p>
+          <a:p>
+            <a:pPr marL="0" indent="0">
+              <a:lnSpc>
+                <a:spcPct val="107000"/>
+              </a:lnSpc>
+              <a:spcAft>
+                <a:spcPts val="800"/>
+              </a:spcAft>
+              <a:buNone/>
+            </a:pPr>
+            <a:r>
+              <a:rPr lang="en-US" sz="2200" i="1" kern="100" dirty="0">
+                <a:solidFill>
+                  <a:srgbClr val="C00000"/>
+                </a:solidFill>
+                <a:effectLst/>
+                <a:latin typeface="Calibri" panose="020F0502020204030204" pitchFamily="34" charset="0"/>
+                <a:ea typeface="Calibri" panose="020F0502020204030204" pitchFamily="34" charset="0"/>
+                <a:cs typeface="Calibri" panose="020F0502020204030204" pitchFamily="34" charset="0"/>
+              </a:rPr>
+              <a:t>gUFO  “phase”.</a:t>
+            </a:r>
+            <a:endParaRPr lang="it-IT" sz="2200" kern="100" dirty="0">
+              <a:effectLst/>
+              <a:latin typeface="Calibri" panose="020F0502020204030204" pitchFamily="34" charset="0"/>
+              <a:ea typeface="Calibri" panose="020F0502020204030204" pitchFamily="34" charset="0"/>
+              <a:cs typeface="Calibri" panose="020F0502020204030204" pitchFamily="34" charset="0"/>
+            </a:endParaRPr>
+          </a:p>
+          <a:p>
+            <a:pPr marL="342900" lvl="0" indent="-342900">
+              <a:lnSpc>
+                <a:spcPct val="107000"/>
+              </a:lnSpc>
+              <a:spcAft>
+                <a:spcPts val="800"/>
+              </a:spcAft>
+              <a:buFont typeface="Arial" panose="020B0604020202020204" pitchFamily="34" charset="0"/>
+              <a:buChar char="•"/>
+              <a:tabLst>
+                <a:tab pos="457200" algn="l"/>
+              </a:tabLst>
+            </a:pPr>
+            <a:r>
+              <a:rPr lang="en-US" sz="2200" kern="100" dirty="0">
+                <a:effectLst/>
+                <a:latin typeface="Calibri" panose="020F0502020204030204" pitchFamily="34" charset="0"/>
+                <a:ea typeface="Calibri" panose="020F0502020204030204" pitchFamily="34" charset="0"/>
+                <a:cs typeface="Calibri" panose="020F0502020204030204" pitchFamily="34" charset="0"/>
+              </a:rPr>
+              <a:t>In Protégé: to create a corresponding individual (same class URI, </a:t>
+            </a:r>
+            <a:r>
+              <a:rPr lang="en-US" sz="2200" i="1" kern="100" dirty="0">
+                <a:effectLst/>
+                <a:latin typeface="Calibri" panose="020F0502020204030204" pitchFamily="34" charset="0"/>
+                <a:ea typeface="Calibri" panose="020F0502020204030204" pitchFamily="34" charset="0"/>
+                <a:cs typeface="Calibri" panose="020F0502020204030204" pitchFamily="34" charset="0"/>
+              </a:rPr>
+              <a:t>Punning</a:t>
+            </a:r>
+            <a:r>
+              <a:rPr lang="en-US" sz="2200" kern="100" dirty="0">
+                <a:effectLst/>
+                <a:latin typeface="Calibri" panose="020F0502020204030204" pitchFamily="34" charset="0"/>
+                <a:ea typeface="Calibri" panose="020F0502020204030204" pitchFamily="34" charset="0"/>
+                <a:cs typeface="Calibri" panose="020F0502020204030204" pitchFamily="34" charset="0"/>
+              </a:rPr>
+              <a:t>).</a:t>
+            </a:r>
+            <a:endParaRPr lang="it-IT" sz="2200" kern="100" dirty="0">
+              <a:effectLst/>
+              <a:latin typeface="Calibri" panose="020F0502020204030204" pitchFamily="34" charset="0"/>
+              <a:ea typeface="Calibri" panose="020F0502020204030204" pitchFamily="34" charset="0"/>
+              <a:cs typeface="Calibri" panose="020F0502020204030204" pitchFamily="34" charset="0"/>
+            </a:endParaRPr>
+          </a:p>
+          <a:p>
+            <a:pPr marL="342900" lvl="0" indent="-342900">
+              <a:lnSpc>
+                <a:spcPct val="107000"/>
+              </a:lnSpc>
+              <a:spcAft>
+                <a:spcPts val="800"/>
+              </a:spcAft>
+              <a:buFont typeface="Arial" panose="020B0604020202020204" pitchFamily="34" charset="0"/>
+              <a:buChar char="•"/>
+              <a:tabLst>
+                <a:tab pos="457200" algn="l"/>
+              </a:tabLst>
+            </a:pPr>
+            <a:r>
+              <a:rPr lang="en-US" sz="2200" kern="100" dirty="0">
+                <a:effectLst/>
+                <a:latin typeface="Calibri" panose="020F0502020204030204" pitchFamily="34" charset="0"/>
+                <a:ea typeface="Calibri" panose="020F0502020204030204" pitchFamily="34" charset="0"/>
+                <a:cs typeface="Calibri" panose="020F0502020204030204" pitchFamily="34" charset="0"/>
+              </a:rPr>
+              <a:t>In Protégé: to add the </a:t>
+            </a:r>
+            <a:r>
+              <a:rPr lang="en-US" sz="2200" u="sng" kern="100" dirty="0">
+                <a:solidFill>
+                  <a:srgbClr val="467886"/>
+                </a:solidFill>
+                <a:effectLst/>
+                <a:latin typeface="Calibri" panose="020F0502020204030204" pitchFamily="34" charset="0"/>
+                <a:ea typeface="Calibri" panose="020F0502020204030204" pitchFamily="34" charset="0"/>
+                <a:cs typeface="Calibri" panose="020F0502020204030204" pitchFamily="34" charset="0"/>
+                <a:hlinkClick r:id="rId2"/>
+              </a:rPr>
+              <a:t>SCO “complex system” individual</a:t>
+            </a:r>
+            <a:r>
+              <a:rPr lang="en-US" sz="2200" kern="100" dirty="0">
+                <a:effectLst/>
+                <a:latin typeface="Calibri" panose="020F0502020204030204" pitchFamily="34" charset="0"/>
+                <a:ea typeface="Calibri" panose="020F0502020204030204" pitchFamily="34" charset="0"/>
+                <a:cs typeface="Calibri" panose="020F0502020204030204" pitchFamily="34" charset="0"/>
+              </a:rPr>
+              <a:t> </a:t>
+            </a:r>
+            <a:r>
+              <a:rPr lang="en-US" sz="2200" kern="100" dirty="0" err="1">
+                <a:effectLst/>
+                <a:latin typeface="Calibri" panose="020F0502020204030204" pitchFamily="34" charset="0"/>
+                <a:ea typeface="Calibri" panose="020F0502020204030204" pitchFamily="34" charset="0"/>
+                <a:cs typeface="Calibri" panose="020F0502020204030204" pitchFamily="34" charset="0"/>
+              </a:rPr>
+              <a:t>rdf:type</a:t>
+            </a:r>
+            <a:r>
+              <a:rPr lang="en-US" sz="2200" kern="100" dirty="0">
+                <a:effectLst/>
+                <a:latin typeface="Calibri" panose="020F0502020204030204" pitchFamily="34" charset="0"/>
+                <a:ea typeface="Calibri" panose="020F0502020204030204" pitchFamily="34" charset="0"/>
+                <a:cs typeface="Calibri" panose="020F0502020204030204" pitchFamily="34" charset="0"/>
+              </a:rPr>
+              <a:t> gUFO “phase” class assertion.</a:t>
+            </a:r>
+          </a:p>
+          <a:p>
+            <a:pPr marL="342900" lvl="0" indent="-342900">
+              <a:lnSpc>
+                <a:spcPct val="107000"/>
+              </a:lnSpc>
+              <a:spcAft>
+                <a:spcPts val="800"/>
+              </a:spcAft>
+              <a:buFont typeface="Arial" panose="020B0604020202020204" pitchFamily="34" charset="0"/>
+              <a:buChar char="•"/>
+              <a:tabLst>
+                <a:tab pos="457200" algn="l"/>
+              </a:tabLst>
+            </a:pPr>
+            <a:endParaRPr lang="it-IT" sz="2200" kern="100" dirty="0">
+              <a:effectLst/>
+              <a:latin typeface="Calibri" panose="020F0502020204030204" pitchFamily="34" charset="0"/>
+              <a:ea typeface="Calibri" panose="020F0502020204030204" pitchFamily="34" charset="0"/>
+              <a:cs typeface="Calibri" panose="020F0502020204030204" pitchFamily="34" charset="0"/>
+            </a:endParaRPr>
+          </a:p>
           <a:p>
             <a:pPr>
               <a:lnSpc>
@@ -5098,33 +6497,15 @@
               </a:spcAft>
             </a:pPr>
             <a:r>
-              <a:rPr lang="en-US" sz="2000" kern="100" dirty="0">
+              <a:rPr lang="en-US" sz="2200" kern="100" dirty="0">
                 <a:effectLst/>
                 <a:latin typeface="Calibri" panose="020F0502020204030204" pitchFamily="34" charset="0"/>
                 <a:ea typeface="Calibri" panose="020F0502020204030204" pitchFamily="34" charset="0"/>
                 <a:cs typeface="Calibri" panose="020F0502020204030204" pitchFamily="34" charset="0"/>
               </a:rPr>
-              <a:t>Arp, R., Smith, B., &amp; Spear, A. D. (2015). </a:t>
-            </a:r>
-            <a:r>
-              <a:rPr lang="en-US" sz="2000" i="1" kern="100" dirty="0">
-                <a:effectLst/>
-                <a:latin typeface="Calibri" panose="020F0502020204030204" pitchFamily="34" charset="0"/>
-                <a:ea typeface="Calibri" panose="020F0502020204030204" pitchFamily="34" charset="0"/>
-                <a:cs typeface="Calibri" panose="020F0502020204030204" pitchFamily="34" charset="0"/>
-              </a:rPr>
-              <a:t>Building ontologies with Basic Formal Ontology</a:t>
-            </a:r>
-            <a:r>
-              <a:rPr lang="en-US" sz="2000" kern="100" dirty="0">
-                <a:effectLst/>
-                <a:latin typeface="Calibri" panose="020F0502020204030204" pitchFamily="34" charset="0"/>
-                <a:ea typeface="Calibri" panose="020F0502020204030204" pitchFamily="34" charset="0"/>
-                <a:cs typeface="Calibri" panose="020F0502020204030204" pitchFamily="34" charset="0"/>
-              </a:rPr>
-              <a:t>. Massachusetts Institute of Technology.</a:t>
-            </a:r>
-            <a:endParaRPr lang="it-IT" sz="2000" kern="100" dirty="0">
+              <a:t>In parallel: to carry on discussions with subject matter experts.</a:t>
+            </a:r>
+            <a:endParaRPr lang="it-IT" sz="2200" kern="100" dirty="0">
               <a:effectLst/>
               <a:latin typeface="Calibri" panose="020F0502020204030204" pitchFamily="34" charset="0"/>
               <a:ea typeface="Calibri" panose="020F0502020204030204" pitchFamily="34" charset="0"/>
@@ -5132,197 +6513,14 @@
             </a:endParaRPr>
           </a:p>
           <a:p>
-            <a:pPr>
-              <a:lnSpc>
-                <a:spcPct val="107000"/>
-              </a:lnSpc>
-              <a:spcAft>
-                <a:spcPts val="800"/>
-              </a:spcAft>
-            </a:pPr>
-            <a:r>
-              <a:rPr lang="it-IT" sz="2000" kern="100" dirty="0">
-                <a:effectLst/>
-                <a:latin typeface="Calibri" panose="020F0502020204030204" pitchFamily="34" charset="0"/>
-                <a:ea typeface="Calibri" panose="020F0502020204030204" pitchFamily="34" charset="0"/>
-                <a:cs typeface="Calibri" panose="020F0502020204030204" pitchFamily="34" charset="0"/>
-              </a:rPr>
-              <a:t>Guizzardi, G., Botti </a:t>
-            </a:r>
-            <a:r>
-              <a:rPr lang="it-IT" sz="2000" kern="100" dirty="0" err="1">
-                <a:effectLst/>
-                <a:latin typeface="Calibri" panose="020F0502020204030204" pitchFamily="34" charset="0"/>
-                <a:ea typeface="Calibri" panose="020F0502020204030204" pitchFamily="34" charset="0"/>
-                <a:cs typeface="Calibri" panose="020F0502020204030204" pitchFamily="34" charset="0"/>
-              </a:rPr>
-              <a:t>Benevides</a:t>
-            </a:r>
-            <a:r>
-              <a:rPr lang="it-IT" sz="2000" kern="100" dirty="0">
-                <a:effectLst/>
-                <a:latin typeface="Calibri" panose="020F0502020204030204" pitchFamily="34" charset="0"/>
-                <a:ea typeface="Calibri" panose="020F0502020204030204" pitchFamily="34" charset="0"/>
-                <a:cs typeface="Calibri" panose="020F0502020204030204" pitchFamily="34" charset="0"/>
-              </a:rPr>
-              <a:t>, A., Fonseca, C. M., </a:t>
-            </a:r>
-            <a:r>
-              <a:rPr lang="it-IT" sz="2000" kern="100" dirty="0" err="1">
-                <a:effectLst/>
-                <a:latin typeface="Calibri" panose="020F0502020204030204" pitchFamily="34" charset="0"/>
-                <a:ea typeface="Calibri" panose="020F0502020204030204" pitchFamily="34" charset="0"/>
-                <a:cs typeface="Calibri" panose="020F0502020204030204" pitchFamily="34" charset="0"/>
-              </a:rPr>
-              <a:t>Porello</a:t>
-            </a:r>
-            <a:r>
-              <a:rPr lang="it-IT" sz="2000" kern="100" dirty="0">
-                <a:effectLst/>
-                <a:latin typeface="Calibri" panose="020F0502020204030204" pitchFamily="34" charset="0"/>
-                <a:ea typeface="Calibri" panose="020F0502020204030204" pitchFamily="34" charset="0"/>
-                <a:cs typeface="Calibri" panose="020F0502020204030204" pitchFamily="34" charset="0"/>
-              </a:rPr>
-              <a:t>, D., Almeida, J. P. A., &amp; Prince Sales, T. (2022). </a:t>
-            </a:r>
-            <a:r>
-              <a:rPr lang="en-US" sz="2000" kern="100" dirty="0">
-                <a:effectLst/>
-                <a:latin typeface="Calibri" panose="020F0502020204030204" pitchFamily="34" charset="0"/>
-                <a:ea typeface="Calibri" panose="020F0502020204030204" pitchFamily="34" charset="0"/>
-                <a:cs typeface="Calibri" panose="020F0502020204030204" pitchFamily="34" charset="0"/>
-              </a:rPr>
-              <a:t>UFO: Unified Foundational Ontology. </a:t>
-            </a:r>
-            <a:r>
-              <a:rPr lang="en-US" sz="2000" i="1" kern="100" dirty="0">
-                <a:effectLst/>
-                <a:latin typeface="Calibri" panose="020F0502020204030204" pitchFamily="34" charset="0"/>
-                <a:ea typeface="Calibri" panose="020F0502020204030204" pitchFamily="34" charset="0"/>
-                <a:cs typeface="Calibri" panose="020F0502020204030204" pitchFamily="34" charset="0"/>
-              </a:rPr>
-              <a:t>Applied Ontology</a:t>
-            </a:r>
-            <a:r>
-              <a:rPr lang="en-US" sz="2000" kern="100" dirty="0">
-                <a:effectLst/>
-                <a:latin typeface="Calibri" panose="020F0502020204030204" pitchFamily="34" charset="0"/>
-                <a:ea typeface="Calibri" panose="020F0502020204030204" pitchFamily="34" charset="0"/>
-                <a:cs typeface="Calibri" panose="020F0502020204030204" pitchFamily="34" charset="0"/>
-              </a:rPr>
-              <a:t>, </a:t>
-            </a:r>
-            <a:r>
-              <a:rPr lang="en-US" sz="2000" i="1" kern="100" dirty="0">
-                <a:effectLst/>
-                <a:latin typeface="Calibri" panose="020F0502020204030204" pitchFamily="34" charset="0"/>
-                <a:ea typeface="Calibri" panose="020F0502020204030204" pitchFamily="34" charset="0"/>
-                <a:cs typeface="Calibri" panose="020F0502020204030204" pitchFamily="34" charset="0"/>
-              </a:rPr>
-              <a:t>17</a:t>
-            </a:r>
-            <a:r>
-              <a:rPr lang="en-US" sz="2000" kern="100" dirty="0">
-                <a:effectLst/>
-                <a:latin typeface="Calibri" panose="020F0502020204030204" pitchFamily="34" charset="0"/>
-                <a:ea typeface="Calibri" panose="020F0502020204030204" pitchFamily="34" charset="0"/>
-                <a:cs typeface="Calibri" panose="020F0502020204030204" pitchFamily="34" charset="0"/>
-              </a:rPr>
-              <a:t>(1), 167–210. </a:t>
-            </a:r>
-            <a:r>
-              <a:rPr lang="en-US" sz="2000" kern="100" dirty="0">
-                <a:effectLst/>
-                <a:latin typeface="Calibri" panose="020F0502020204030204" pitchFamily="34" charset="0"/>
-                <a:ea typeface="Calibri" panose="020F0502020204030204" pitchFamily="34" charset="0"/>
-                <a:cs typeface="Calibri" panose="020F0502020204030204" pitchFamily="34" charset="0"/>
-                <a:hlinkClick r:id="rId2"/>
-              </a:rPr>
-              <a:t>https://doi.org/10.3233/AO-210256</a:t>
-            </a:r>
-            <a:r>
-              <a:rPr lang="en-US" sz="2000" kern="100" dirty="0">
-                <a:effectLst/>
-                <a:latin typeface="Calibri" panose="020F0502020204030204" pitchFamily="34" charset="0"/>
-                <a:ea typeface="Calibri" panose="020F0502020204030204" pitchFamily="34" charset="0"/>
-                <a:cs typeface="Calibri" panose="020F0502020204030204" pitchFamily="34" charset="0"/>
-              </a:rPr>
-              <a:t> </a:t>
-            </a:r>
-            <a:endParaRPr lang="it-IT" sz="2000" kern="100" dirty="0">
-              <a:effectLst/>
-              <a:latin typeface="Calibri" panose="020F0502020204030204" pitchFamily="34" charset="0"/>
-              <a:ea typeface="Calibri" panose="020F0502020204030204" pitchFamily="34" charset="0"/>
-              <a:cs typeface="Calibri" panose="020F0502020204030204" pitchFamily="34" charset="0"/>
-            </a:endParaRPr>
-          </a:p>
-          <a:p>
-            <a:r>
-              <a:rPr lang="en-US" sz="2000" dirty="0">
-                <a:latin typeface="Calibri" panose="020F0502020204030204" pitchFamily="34" charset="0"/>
-                <a:ea typeface="Calibri" panose="020F0502020204030204" pitchFamily="34" charset="0"/>
-                <a:cs typeface="Calibri" panose="020F0502020204030204" pitchFamily="34" charset="0"/>
-                <a:hlinkClick r:id="rId3"/>
-              </a:rPr>
-              <a:t>https://nemo-ufes.github.io/gufo/#concreteindividuals</a:t>
-            </a:r>
-            <a:r>
-              <a:rPr lang="en-US" sz="2000" dirty="0">
-                <a:latin typeface="Calibri" panose="020F0502020204030204" pitchFamily="34" charset="0"/>
-                <a:ea typeface="Calibri" panose="020F0502020204030204" pitchFamily="34" charset="0"/>
-                <a:cs typeface="Calibri" panose="020F0502020204030204" pitchFamily="34" charset="0"/>
-              </a:rPr>
-              <a:t> +</a:t>
-            </a:r>
-            <a:r>
-              <a:rPr lang="en-US" sz="2000" dirty="0" err="1">
-                <a:latin typeface="Calibri" panose="020F0502020204030204" pitchFamily="34" charset="0"/>
-                <a:ea typeface="Calibri" panose="020F0502020204030204" pitchFamily="34" charset="0"/>
-                <a:cs typeface="Calibri" panose="020F0502020204030204" pitchFamily="34" charset="0"/>
-              </a:rPr>
-              <a:t>ttl</a:t>
-            </a:r>
-            <a:r>
-              <a:rPr lang="en-US" sz="2000" dirty="0">
-                <a:latin typeface="Calibri" panose="020F0502020204030204" pitchFamily="34" charset="0"/>
-                <a:ea typeface="Calibri" panose="020F0502020204030204" pitchFamily="34" charset="0"/>
-                <a:cs typeface="Calibri" panose="020F0502020204030204" pitchFamily="34" charset="0"/>
-              </a:rPr>
-              <a:t> file.</a:t>
-            </a:r>
-          </a:p>
-          <a:p>
-            <a:r>
-              <a:rPr lang="en-US" sz="2000" dirty="0">
-                <a:latin typeface="Calibri" panose="020F0502020204030204" pitchFamily="34" charset="0"/>
-                <a:ea typeface="Calibri" panose="020F0502020204030204" pitchFamily="34" charset="0"/>
-                <a:cs typeface="Calibri" panose="020F0502020204030204" pitchFamily="34" charset="0"/>
-              </a:rPr>
-              <a:t>COVER </a:t>
-            </a:r>
-            <a:r>
-              <a:rPr lang="en-US" sz="2000" dirty="0" err="1">
-                <a:latin typeface="Calibri" panose="020F0502020204030204" pitchFamily="34" charset="0"/>
-                <a:ea typeface="Calibri" panose="020F0502020204030204" pitchFamily="34" charset="0"/>
-                <a:cs typeface="Calibri" panose="020F0502020204030204" pitchFamily="34" charset="0"/>
-              </a:rPr>
-              <a:t>ttl</a:t>
-            </a:r>
-            <a:r>
-              <a:rPr lang="en-US" sz="2000" dirty="0">
-                <a:latin typeface="Calibri" panose="020F0502020204030204" pitchFamily="34" charset="0"/>
-                <a:ea typeface="Calibri" panose="020F0502020204030204" pitchFamily="34" charset="0"/>
-                <a:cs typeface="Calibri" panose="020F0502020204030204" pitchFamily="34" charset="0"/>
-              </a:rPr>
-              <a:t> file. </a:t>
-            </a:r>
+            <a:endParaRPr lang="it-IT" dirty="0"/>
           </a:p>
         </p:txBody>
       </p:sp>
     </p:spTree>
     <p:extLst>
       <p:ext uri="{BB962C8B-B14F-4D97-AF65-F5344CB8AC3E}">
-        <p14:creationId xmlns:p14="http://schemas.microsoft.com/office/powerpoint/2010/main" val="2123806945"/>
+        <p14:creationId xmlns:p14="http://schemas.microsoft.com/office/powerpoint/2010/main" val="165104941"/>
       </p:ext>
     </p:extLst>
   </p:cSld>

</xml_diff>

<commit_message>
Working on the protocol
</commit_message>
<xml_diff>
--- a/SCO/working materials/Slide deck - SCO-UFO aligment.pptx
+++ b/SCO/working materials/Slide deck - SCO-UFO aligment.pptx
@@ -211,7 +211,7 @@
           <a:p>
             <a:fld id="{03C72250-7A58-4674-B3F7-A9077735BB67}" type="datetimeFigureOut">
               <a:rPr lang="it-IT" smtClean="0"/>
-              <a:t>17/02/2025</a:t>
+              <a:t>18/02/2025</a:t>
             </a:fld>
             <a:endParaRPr lang="it-IT"/>
           </a:p>
@@ -628,7 +628,7 @@
           <a:p>
             <a:fld id="{C8F8D270-4168-40DB-AC4E-630264CAC1B5}" type="datetimeFigureOut">
               <a:rPr lang="it-IT" smtClean="0"/>
-              <a:t>17/02/2025</a:t>
+              <a:t>18/02/2025</a:t>
             </a:fld>
             <a:endParaRPr lang="it-IT"/>
           </a:p>
@@ -828,7 +828,7 @@
           <a:p>
             <a:fld id="{C8F8D270-4168-40DB-AC4E-630264CAC1B5}" type="datetimeFigureOut">
               <a:rPr lang="it-IT" smtClean="0"/>
-              <a:t>17/02/2025</a:t>
+              <a:t>18/02/2025</a:t>
             </a:fld>
             <a:endParaRPr lang="it-IT"/>
           </a:p>
@@ -1038,7 +1038,7 @@
           <a:p>
             <a:fld id="{C8F8D270-4168-40DB-AC4E-630264CAC1B5}" type="datetimeFigureOut">
               <a:rPr lang="it-IT" smtClean="0"/>
-              <a:t>17/02/2025</a:t>
+              <a:t>18/02/2025</a:t>
             </a:fld>
             <a:endParaRPr lang="it-IT"/>
           </a:p>
@@ -1238,7 +1238,7 @@
           <a:p>
             <a:fld id="{C8F8D270-4168-40DB-AC4E-630264CAC1B5}" type="datetimeFigureOut">
               <a:rPr lang="it-IT" smtClean="0"/>
-              <a:t>17/02/2025</a:t>
+              <a:t>18/02/2025</a:t>
             </a:fld>
             <a:endParaRPr lang="it-IT"/>
           </a:p>
@@ -1514,7 +1514,7 @@
           <a:p>
             <a:fld id="{C8F8D270-4168-40DB-AC4E-630264CAC1B5}" type="datetimeFigureOut">
               <a:rPr lang="it-IT" smtClean="0"/>
-              <a:t>17/02/2025</a:t>
+              <a:t>18/02/2025</a:t>
             </a:fld>
             <a:endParaRPr lang="it-IT"/>
           </a:p>
@@ -1782,7 +1782,7 @@
           <a:p>
             <a:fld id="{C8F8D270-4168-40DB-AC4E-630264CAC1B5}" type="datetimeFigureOut">
               <a:rPr lang="it-IT" smtClean="0"/>
-              <a:t>17/02/2025</a:t>
+              <a:t>18/02/2025</a:t>
             </a:fld>
             <a:endParaRPr lang="it-IT"/>
           </a:p>
@@ -2197,7 +2197,7 @@
           <a:p>
             <a:fld id="{C8F8D270-4168-40DB-AC4E-630264CAC1B5}" type="datetimeFigureOut">
               <a:rPr lang="it-IT" smtClean="0"/>
-              <a:t>17/02/2025</a:t>
+              <a:t>18/02/2025</a:t>
             </a:fld>
             <a:endParaRPr lang="it-IT"/>
           </a:p>
@@ -2339,7 +2339,7 @@
           <a:p>
             <a:fld id="{C8F8D270-4168-40DB-AC4E-630264CAC1B5}" type="datetimeFigureOut">
               <a:rPr lang="it-IT" smtClean="0"/>
-              <a:t>17/02/2025</a:t>
+              <a:t>18/02/2025</a:t>
             </a:fld>
             <a:endParaRPr lang="it-IT"/>
           </a:p>
@@ -2452,7 +2452,7 @@
           <a:p>
             <a:fld id="{C8F8D270-4168-40DB-AC4E-630264CAC1B5}" type="datetimeFigureOut">
               <a:rPr lang="it-IT" smtClean="0"/>
-              <a:t>17/02/2025</a:t>
+              <a:t>18/02/2025</a:t>
             </a:fld>
             <a:endParaRPr lang="it-IT"/>
           </a:p>
@@ -2765,7 +2765,7 @@
           <a:p>
             <a:fld id="{C8F8D270-4168-40DB-AC4E-630264CAC1B5}" type="datetimeFigureOut">
               <a:rPr lang="it-IT" smtClean="0"/>
-              <a:t>17/02/2025</a:t>
+              <a:t>18/02/2025</a:t>
             </a:fld>
             <a:endParaRPr lang="it-IT"/>
           </a:p>
@@ -3054,7 +3054,7 @@
           <a:p>
             <a:fld id="{C8F8D270-4168-40DB-AC4E-630264CAC1B5}" type="datetimeFigureOut">
               <a:rPr lang="it-IT" smtClean="0"/>
-              <a:t>17/02/2025</a:t>
+              <a:t>18/02/2025</a:t>
             </a:fld>
             <a:endParaRPr lang="it-IT"/>
           </a:p>
@@ -3297,7 +3297,7 @@
           <a:p>
             <a:fld id="{C8F8D270-4168-40DB-AC4E-630264CAC1B5}" type="datetimeFigureOut">
               <a:rPr lang="it-IT" smtClean="0"/>
-              <a:t>17/02/2025</a:t>
+              <a:t>18/02/2025</a:t>
             </a:fld>
             <a:endParaRPr lang="it-IT"/>
           </a:p>
@@ -6097,7 +6097,145 @@
               </a:rPr>
               <a:t>See the next slides for details. </a:t>
             </a:r>
-            <a:endParaRPr lang="it-IT" sz="2000" dirty="0">
+          </a:p>
+          <a:p>
+            <a:pPr lvl="1"/>
+            <a:endParaRPr lang="en-US" sz="2000" dirty="0">
+              <a:solidFill>
+                <a:srgbClr val="1F2328"/>
+              </a:solidFill>
+              <a:latin typeface="Calibri" panose="020F0502020204030204" pitchFamily="34" charset="0"/>
+              <a:ea typeface="Calibri" panose="020F0502020204030204" pitchFamily="34" charset="0"/>
+              <a:cs typeface="Calibri" panose="020F0502020204030204" pitchFamily="34" charset="0"/>
+            </a:endParaRPr>
+          </a:p>
+          <a:p>
+            <a:pPr lvl="1"/>
+            <a:endParaRPr lang="en-US" sz="2000" dirty="0">
+              <a:solidFill>
+                <a:srgbClr val="1F2328"/>
+              </a:solidFill>
+              <a:latin typeface="Calibri" panose="020F0502020204030204" pitchFamily="34" charset="0"/>
+              <a:ea typeface="Calibri" panose="020F0502020204030204" pitchFamily="34" charset="0"/>
+              <a:cs typeface="Calibri" panose="020F0502020204030204" pitchFamily="34" charset="0"/>
+            </a:endParaRPr>
+          </a:p>
+          <a:p>
+            <a:r>
+              <a:rPr lang="it-IT" sz="2400" dirty="0" err="1">
+                <a:solidFill>
+                  <a:srgbClr val="1F2328"/>
+                </a:solidFill>
+                <a:latin typeface="Calibri" panose="020F0502020204030204" pitchFamily="34" charset="0"/>
+                <a:ea typeface="Calibri" panose="020F0502020204030204" pitchFamily="34" charset="0"/>
+                <a:cs typeface="Calibri" panose="020F0502020204030204" pitchFamily="34" charset="0"/>
+              </a:rPr>
+              <a:t>We</a:t>
+            </a:r>
+            <a:r>
+              <a:rPr lang="it-IT" sz="2400" dirty="0">
+                <a:solidFill>
+                  <a:srgbClr val="1F2328"/>
+                </a:solidFill>
+                <a:latin typeface="Calibri" panose="020F0502020204030204" pitchFamily="34" charset="0"/>
+                <a:ea typeface="Calibri" panose="020F0502020204030204" pitchFamily="34" charset="0"/>
+                <a:cs typeface="Calibri" panose="020F0502020204030204" pitchFamily="34" charset="0"/>
+              </a:rPr>
+              <a:t> </a:t>
+            </a:r>
+            <a:r>
+              <a:rPr lang="it-IT" sz="2400" dirty="0" err="1">
+                <a:solidFill>
+                  <a:srgbClr val="1F2328"/>
+                </a:solidFill>
+                <a:latin typeface="Calibri" panose="020F0502020204030204" pitchFamily="34" charset="0"/>
+                <a:ea typeface="Calibri" panose="020F0502020204030204" pitchFamily="34" charset="0"/>
+                <a:cs typeface="Calibri" panose="020F0502020204030204" pitchFamily="34" charset="0"/>
+              </a:rPr>
+              <a:t>construct</a:t>
+            </a:r>
+            <a:r>
+              <a:rPr lang="it-IT" sz="2400" dirty="0">
+                <a:solidFill>
+                  <a:srgbClr val="1F2328"/>
+                </a:solidFill>
+                <a:latin typeface="Calibri" panose="020F0502020204030204" pitchFamily="34" charset="0"/>
+                <a:ea typeface="Calibri" panose="020F0502020204030204" pitchFamily="34" charset="0"/>
+                <a:cs typeface="Calibri" panose="020F0502020204030204" pitchFamily="34" charset="0"/>
+              </a:rPr>
+              <a:t> the </a:t>
+            </a:r>
+            <a:r>
+              <a:rPr lang="it-IT" sz="2400" dirty="0" err="1">
+                <a:solidFill>
+                  <a:srgbClr val="1F2328"/>
+                </a:solidFill>
+                <a:latin typeface="Calibri" panose="020F0502020204030204" pitchFamily="34" charset="0"/>
+                <a:ea typeface="Calibri" panose="020F0502020204030204" pitchFamily="34" charset="0"/>
+                <a:cs typeface="Calibri" panose="020F0502020204030204" pitchFamily="34" charset="0"/>
+              </a:rPr>
+              <a:t>alignments</a:t>
+            </a:r>
+            <a:r>
+              <a:rPr lang="it-IT" sz="2400" dirty="0">
+                <a:solidFill>
+                  <a:srgbClr val="1F2328"/>
+                </a:solidFill>
+                <a:latin typeface="Calibri" panose="020F0502020204030204" pitchFamily="34" charset="0"/>
+                <a:ea typeface="Calibri" panose="020F0502020204030204" pitchFamily="34" charset="0"/>
+                <a:cs typeface="Calibri" panose="020F0502020204030204" pitchFamily="34" charset="0"/>
+              </a:rPr>
+              <a:t> </a:t>
+            </a:r>
+            <a:r>
+              <a:rPr lang="it-IT" sz="2400" dirty="0" err="1">
+                <a:solidFill>
+                  <a:srgbClr val="1F2328"/>
+                </a:solidFill>
+                <a:latin typeface="Calibri" panose="020F0502020204030204" pitchFamily="34" charset="0"/>
+                <a:ea typeface="Calibri" panose="020F0502020204030204" pitchFamily="34" charset="0"/>
+                <a:cs typeface="Calibri" panose="020F0502020204030204" pitchFamily="34" charset="0"/>
+              </a:rPr>
+              <a:t>using</a:t>
+            </a:r>
+            <a:r>
+              <a:rPr lang="it-IT" sz="2400" dirty="0">
+                <a:solidFill>
+                  <a:srgbClr val="1F2328"/>
+                </a:solidFill>
+                <a:latin typeface="Calibri" panose="020F0502020204030204" pitchFamily="34" charset="0"/>
+                <a:ea typeface="Calibri" panose="020F0502020204030204" pitchFamily="34" charset="0"/>
+                <a:cs typeface="Calibri" panose="020F0502020204030204" pitchFamily="34" charset="0"/>
+              </a:rPr>
+              <a:t> </a:t>
+            </a:r>
+            <a:r>
+              <a:rPr lang="it-IT" sz="2400" dirty="0">
+                <a:solidFill>
+                  <a:srgbClr val="1F2328"/>
+                </a:solidFill>
+                <a:latin typeface="Calibri" panose="020F0502020204030204" pitchFamily="34" charset="0"/>
+                <a:ea typeface="Calibri" panose="020F0502020204030204" pitchFamily="34" charset="0"/>
+                <a:cs typeface="Calibri" panose="020F0502020204030204" pitchFamily="34" charset="0"/>
+                <a:hlinkClick r:id="rId2"/>
+              </a:rPr>
+              <a:t>Protégé</a:t>
+            </a:r>
+            <a:r>
+              <a:rPr lang="it-IT" sz="2400" dirty="0">
+                <a:solidFill>
+                  <a:srgbClr val="1F2328"/>
+                </a:solidFill>
+                <a:latin typeface="Calibri" panose="020F0502020204030204" pitchFamily="34" charset="0"/>
+                <a:ea typeface="Calibri" panose="020F0502020204030204" pitchFamily="34" charset="0"/>
+                <a:cs typeface="Calibri" panose="020F0502020204030204" pitchFamily="34" charset="0"/>
+              </a:rPr>
+              <a:t>.</a:t>
+            </a:r>
+            <a:endParaRPr lang="en-US" sz="2400" dirty="0">
+              <a:solidFill>
+                <a:srgbClr val="1F2328"/>
+              </a:solidFill>
               <a:latin typeface="Calibri" panose="020F0502020204030204" pitchFamily="34" charset="0"/>
               <a:ea typeface="Calibri" panose="020F0502020204030204" pitchFamily="34" charset="0"/>
               <a:cs typeface="Calibri" panose="020F0502020204030204" pitchFamily="34" charset="0"/>
@@ -6222,6 +6360,38 @@
             <a:normAutofit/>
           </a:bodyPr>
           <a:lstStyle/>
+          <a:p>
+            <a:pPr marL="0" indent="0">
+              <a:lnSpc>
+                <a:spcPct val="107000"/>
+              </a:lnSpc>
+              <a:spcAft>
+                <a:spcPts val="800"/>
+              </a:spcAft>
+              <a:buNone/>
+              <a:tabLst>
+                <a:tab pos="457200" algn="l"/>
+              </a:tabLst>
+            </a:pPr>
+            <a:r>
+              <a:rPr lang="en-US" sz="2400" b="1" kern="100" dirty="0" err="1">
+                <a:effectLst/>
+                <a:latin typeface="Calibri" panose="020F0502020204030204" pitchFamily="34" charset="0"/>
+                <a:ea typeface="Aptos" panose="020B0004020202020204" pitchFamily="34" charset="0"/>
+                <a:cs typeface="Times New Roman" panose="02020603050405020304" pitchFamily="18" charset="0"/>
+              </a:rPr>
+              <a:t>gUFO</a:t>
+            </a:r>
+            <a:r>
+              <a:rPr lang="en-US" sz="2400" b="1" kern="100" dirty="0">
+                <a:effectLst/>
+                <a:latin typeface="Calibri" panose="020F0502020204030204" pitchFamily="34" charset="0"/>
+                <a:ea typeface="Aptos" panose="020B0004020202020204" pitchFamily="34" charset="0"/>
+                <a:cs typeface="Times New Roman" panose="02020603050405020304" pitchFamily="18" charset="0"/>
+              </a:rPr>
+              <a:t> Import </a:t>
+            </a:r>
+          </a:p>
           <a:p>
             <a:pPr marL="0" indent="0">
               <a:lnSpc>

</xml_diff>

<commit_message>
Revisions + comments (agency)
</commit_message>
<xml_diff>
--- a/SCO/working materials/Slide deck - SCO-UFO aligment.pptx
+++ b/SCO/working materials/Slide deck - SCO-UFO aligment.pptx
@@ -211,7 +211,7 @@
           <a:p>
             <a:fld id="{03C72250-7A58-4674-B3F7-A9077735BB67}" type="datetimeFigureOut">
               <a:rPr lang="it-IT" smtClean="0"/>
-              <a:t>18/02/2025</a:t>
+              <a:t>04/03/2025</a:t>
             </a:fld>
             <a:endParaRPr lang="it-IT"/>
           </a:p>
@@ -628,7 +628,7 @@
           <a:p>
             <a:fld id="{C8F8D270-4168-40DB-AC4E-630264CAC1B5}" type="datetimeFigureOut">
               <a:rPr lang="it-IT" smtClean="0"/>
-              <a:t>18/02/2025</a:t>
+              <a:t>04/03/2025</a:t>
             </a:fld>
             <a:endParaRPr lang="it-IT"/>
           </a:p>
@@ -828,7 +828,7 @@
           <a:p>
             <a:fld id="{C8F8D270-4168-40DB-AC4E-630264CAC1B5}" type="datetimeFigureOut">
               <a:rPr lang="it-IT" smtClean="0"/>
-              <a:t>18/02/2025</a:t>
+              <a:t>04/03/2025</a:t>
             </a:fld>
             <a:endParaRPr lang="it-IT"/>
           </a:p>
@@ -1038,7 +1038,7 @@
           <a:p>
             <a:fld id="{C8F8D270-4168-40DB-AC4E-630264CAC1B5}" type="datetimeFigureOut">
               <a:rPr lang="it-IT" smtClean="0"/>
-              <a:t>18/02/2025</a:t>
+              <a:t>04/03/2025</a:t>
             </a:fld>
             <a:endParaRPr lang="it-IT"/>
           </a:p>
@@ -1238,7 +1238,7 @@
           <a:p>
             <a:fld id="{C8F8D270-4168-40DB-AC4E-630264CAC1B5}" type="datetimeFigureOut">
               <a:rPr lang="it-IT" smtClean="0"/>
-              <a:t>18/02/2025</a:t>
+              <a:t>04/03/2025</a:t>
             </a:fld>
             <a:endParaRPr lang="it-IT"/>
           </a:p>
@@ -1514,7 +1514,7 @@
           <a:p>
             <a:fld id="{C8F8D270-4168-40DB-AC4E-630264CAC1B5}" type="datetimeFigureOut">
               <a:rPr lang="it-IT" smtClean="0"/>
-              <a:t>18/02/2025</a:t>
+              <a:t>04/03/2025</a:t>
             </a:fld>
             <a:endParaRPr lang="it-IT"/>
           </a:p>
@@ -1782,7 +1782,7 @@
           <a:p>
             <a:fld id="{C8F8D270-4168-40DB-AC4E-630264CAC1B5}" type="datetimeFigureOut">
               <a:rPr lang="it-IT" smtClean="0"/>
-              <a:t>18/02/2025</a:t>
+              <a:t>04/03/2025</a:t>
             </a:fld>
             <a:endParaRPr lang="it-IT"/>
           </a:p>
@@ -2197,7 +2197,7 @@
           <a:p>
             <a:fld id="{C8F8D270-4168-40DB-AC4E-630264CAC1B5}" type="datetimeFigureOut">
               <a:rPr lang="it-IT" smtClean="0"/>
-              <a:t>18/02/2025</a:t>
+              <a:t>04/03/2025</a:t>
             </a:fld>
             <a:endParaRPr lang="it-IT"/>
           </a:p>
@@ -2339,7 +2339,7 @@
           <a:p>
             <a:fld id="{C8F8D270-4168-40DB-AC4E-630264CAC1B5}" type="datetimeFigureOut">
               <a:rPr lang="it-IT" smtClean="0"/>
-              <a:t>18/02/2025</a:t>
+              <a:t>04/03/2025</a:t>
             </a:fld>
             <a:endParaRPr lang="it-IT"/>
           </a:p>
@@ -2452,7 +2452,7 @@
           <a:p>
             <a:fld id="{C8F8D270-4168-40DB-AC4E-630264CAC1B5}" type="datetimeFigureOut">
               <a:rPr lang="it-IT" smtClean="0"/>
-              <a:t>18/02/2025</a:t>
+              <a:t>04/03/2025</a:t>
             </a:fld>
             <a:endParaRPr lang="it-IT"/>
           </a:p>
@@ -2765,7 +2765,7 @@
           <a:p>
             <a:fld id="{C8F8D270-4168-40DB-AC4E-630264CAC1B5}" type="datetimeFigureOut">
               <a:rPr lang="it-IT" smtClean="0"/>
-              <a:t>18/02/2025</a:t>
+              <a:t>04/03/2025</a:t>
             </a:fld>
             <a:endParaRPr lang="it-IT"/>
           </a:p>
@@ -3054,7 +3054,7 @@
           <a:p>
             <a:fld id="{C8F8D270-4168-40DB-AC4E-630264CAC1B5}" type="datetimeFigureOut">
               <a:rPr lang="it-IT" smtClean="0"/>
-              <a:t>18/02/2025</a:t>
+              <a:t>04/03/2025</a:t>
             </a:fld>
             <a:endParaRPr lang="it-IT"/>
           </a:p>
@@ -3297,7 +3297,7 @@
           <a:p>
             <a:fld id="{C8F8D270-4168-40DB-AC4E-630264CAC1B5}" type="datetimeFigureOut">
               <a:rPr lang="it-IT" smtClean="0"/>
-              <a:t>18/02/2025</a:t>
+              <a:t>04/03/2025</a:t>
             </a:fld>
             <a:endParaRPr lang="it-IT"/>
           </a:p>
@@ -5068,46 +5068,37 @@
               </a:spcAft>
             </a:pPr>
             <a:r>
+              <a:rPr lang="en-US" sz="2000" kern="100" dirty="0" err="1">
+                <a:latin typeface="Calibri" panose="020F0502020204030204" pitchFamily="34" charset="0"/>
+                <a:ea typeface="Calibri" panose="020F0502020204030204" pitchFamily="34" charset="0"/>
+                <a:cs typeface="Calibri" panose="020F0502020204030204" pitchFamily="34" charset="0"/>
+                <a:hlinkClick r:id="rId3"/>
+              </a:rPr>
+              <a:t>gUFO</a:t>
+            </a:r>
+            <a:r>
               <a:rPr lang="en-US" sz="2000" kern="100" dirty="0">
                 <a:latin typeface="Calibri" panose="020F0502020204030204" pitchFamily="34" charset="0"/>
                 <a:ea typeface="Calibri" panose="020F0502020204030204" pitchFamily="34" charset="0"/>
                 <a:cs typeface="Calibri" panose="020F0502020204030204" pitchFamily="34" charset="0"/>
                 <a:hlinkClick r:id="rId3"/>
               </a:rPr>
-              <a:t>gUFO</a:t>
-            </a:r>
-            <a:r>
-              <a:rPr lang="it-IT" sz="2000" kern="100" dirty="0">
-                <a:latin typeface="Calibri" panose="020F0502020204030204" pitchFamily="34" charset="0"/>
-                <a:ea typeface="Calibri" panose="020F0502020204030204" pitchFamily="34" charset="0"/>
-                <a:cs typeface="Calibri" panose="020F0502020204030204" pitchFamily="34" charset="0"/>
-              </a:rPr>
-              <a:t> </a:t>
+              <a:t> documentation webpage</a:t>
             </a:r>
             <a:r>
               <a:rPr lang="en-US" sz="2000" dirty="0">
                 <a:latin typeface="Calibri" panose="020F0502020204030204" pitchFamily="34" charset="0"/>
                 <a:ea typeface="Calibri" panose="020F0502020204030204" pitchFamily="34" charset="0"/>
                 <a:cs typeface="Calibri" panose="020F0502020204030204" pitchFamily="34" charset="0"/>
-              </a:rPr>
-              <a:t>and </a:t>
-            </a:r>
-            <a:r>
-              <a:rPr lang="en-US" sz="2000" dirty="0" err="1">
-                <a:latin typeface="Calibri" panose="020F0502020204030204" pitchFamily="34" charset="0"/>
-                <a:ea typeface="Calibri" panose="020F0502020204030204" pitchFamily="34" charset="0"/>
-                <a:cs typeface="Calibri" panose="020F0502020204030204" pitchFamily="34" charset="0"/>
-              </a:rPr>
-              <a:t>gUFO.ttl</a:t>
-            </a:r>
-            <a:r>
-              <a:rPr lang="en-US" sz="2000" dirty="0">
-                <a:latin typeface="Calibri" panose="020F0502020204030204" pitchFamily="34" charset="0"/>
-                <a:ea typeface="Calibri" panose="020F0502020204030204" pitchFamily="34" charset="0"/>
-                <a:cs typeface="Calibri" panose="020F0502020204030204" pitchFamily="34" charset="0"/>
+                <a:hlinkClick r:id="rId3"/>
               </a:rPr>
               <a:t>.</a:t>
             </a:r>
+            <a:endParaRPr lang="en-US" sz="2000" dirty="0">
+              <a:latin typeface="Calibri" panose="020F0502020204030204" pitchFamily="34" charset="0"/>
+              <a:ea typeface="Calibri" panose="020F0502020204030204" pitchFamily="34" charset="0"/>
+              <a:cs typeface="Calibri" panose="020F0502020204030204" pitchFamily="34" charset="0"/>
+            </a:endParaRPr>
           </a:p>
           <a:p>
             <a:r>

</xml_diff>